<commit_message>
update comp 421 ass3
</commit_message>
<xml_diff>
--- a/Comp 421/Assignment/Assignment 3/Ass3.pptx
+++ b/Comp 421/Assignment/Assignment 3/Ass3.pptx
@@ -105,6 +105,11 @@
       </a:defRPr>
     </a:lvl9pPr>
   </p:defaultTextStyle>
+  <p:extLst>
+    <p:ext uri="{EFAFB233-063F-42B5-8137-9DF3F51BA10A}">
+      <p15:sldGuideLst xmlns:p15="http://schemas.microsoft.com/office/powerpoint/2012/main"/>
+    </p:ext>
+  </p:extLst>
 </p:presentation>
 </file>
 
@@ -239,7 +244,7 @@
           <a:p>
             <a:fld id="{62F8648C-FAA9-4B3F-80C3-E0E33CA90474}" type="datetimeFigureOut">
               <a:rPr lang="en-US" smtClean="0"/>
-              <a:t>3/29/2014</a:t>
+              <a:t>3/31/2014</a:t>
             </a:fld>
             <a:endParaRPr lang="en-US"/>
           </a:p>
@@ -409,7 +414,7 @@
           <a:p>
             <a:fld id="{62F8648C-FAA9-4B3F-80C3-E0E33CA90474}" type="datetimeFigureOut">
               <a:rPr lang="en-US" smtClean="0"/>
-              <a:t>3/29/2014</a:t>
+              <a:t>3/31/2014</a:t>
             </a:fld>
             <a:endParaRPr lang="en-US"/>
           </a:p>
@@ -589,7 +594,7 @@
           <a:p>
             <a:fld id="{62F8648C-FAA9-4B3F-80C3-E0E33CA90474}" type="datetimeFigureOut">
               <a:rPr lang="en-US" smtClean="0"/>
-              <a:t>3/29/2014</a:t>
+              <a:t>3/31/2014</a:t>
             </a:fld>
             <a:endParaRPr lang="en-US"/>
           </a:p>
@@ -759,7 +764,7 @@
           <a:p>
             <a:fld id="{62F8648C-FAA9-4B3F-80C3-E0E33CA90474}" type="datetimeFigureOut">
               <a:rPr lang="en-US" smtClean="0"/>
-              <a:t>3/29/2014</a:t>
+              <a:t>3/31/2014</a:t>
             </a:fld>
             <a:endParaRPr lang="en-US"/>
           </a:p>
@@ -1005,7 +1010,7 @@
           <a:p>
             <a:fld id="{62F8648C-FAA9-4B3F-80C3-E0E33CA90474}" type="datetimeFigureOut">
               <a:rPr lang="en-US" smtClean="0"/>
-              <a:t>3/29/2014</a:t>
+              <a:t>3/31/2014</a:t>
             </a:fld>
             <a:endParaRPr lang="en-US"/>
           </a:p>
@@ -1237,7 +1242,7 @@
           <a:p>
             <a:fld id="{62F8648C-FAA9-4B3F-80C3-E0E33CA90474}" type="datetimeFigureOut">
               <a:rPr lang="en-US" smtClean="0"/>
-              <a:t>3/29/2014</a:t>
+              <a:t>3/31/2014</a:t>
             </a:fld>
             <a:endParaRPr lang="en-US"/>
           </a:p>
@@ -1604,7 +1609,7 @@
           <a:p>
             <a:fld id="{62F8648C-FAA9-4B3F-80C3-E0E33CA90474}" type="datetimeFigureOut">
               <a:rPr lang="en-US" smtClean="0"/>
-              <a:t>3/29/2014</a:t>
+              <a:t>3/31/2014</a:t>
             </a:fld>
             <a:endParaRPr lang="en-US"/>
           </a:p>
@@ -1722,7 +1727,7 @@
           <a:p>
             <a:fld id="{62F8648C-FAA9-4B3F-80C3-E0E33CA90474}" type="datetimeFigureOut">
               <a:rPr lang="en-US" smtClean="0"/>
-              <a:t>3/29/2014</a:t>
+              <a:t>3/31/2014</a:t>
             </a:fld>
             <a:endParaRPr lang="en-US"/>
           </a:p>
@@ -1817,7 +1822,7 @@
           <a:p>
             <a:fld id="{62F8648C-FAA9-4B3F-80C3-E0E33CA90474}" type="datetimeFigureOut">
               <a:rPr lang="en-US" smtClean="0"/>
-              <a:t>3/29/2014</a:t>
+              <a:t>3/31/2014</a:t>
             </a:fld>
             <a:endParaRPr lang="en-US"/>
           </a:p>
@@ -2094,7 +2099,7 @@
           <a:p>
             <a:fld id="{62F8648C-FAA9-4B3F-80C3-E0E33CA90474}" type="datetimeFigureOut">
               <a:rPr lang="en-US" smtClean="0"/>
-              <a:t>3/29/2014</a:t>
+              <a:t>3/31/2014</a:t>
             </a:fld>
             <a:endParaRPr lang="en-US"/>
           </a:p>
@@ -2347,7 +2352,7 @@
           <a:p>
             <a:fld id="{62F8648C-FAA9-4B3F-80C3-E0E33CA90474}" type="datetimeFigureOut">
               <a:rPr lang="en-US" smtClean="0"/>
-              <a:t>3/29/2014</a:t>
+              <a:t>3/31/2014</a:t>
             </a:fld>
             <a:endParaRPr lang="en-US"/>
           </a:p>
@@ -2560,7 +2565,7 @@
           <a:p>
             <a:fld id="{62F8648C-FAA9-4B3F-80C3-E0E33CA90474}" type="datetimeFigureOut">
               <a:rPr lang="en-US" smtClean="0"/>
-              <a:t>3/29/2014</a:t>
+              <a:t>3/31/2014</a:t>
             </a:fld>
             <a:endParaRPr lang="en-US"/>
           </a:p>
@@ -3459,8 +3464,8 @@
           <a:chExt cx="0" cy="0"/>
         </a:xfrm>
       </p:grpSpPr>
-      <mc:AlternateContent xmlns:mc="http://schemas.openxmlformats.org/markup-compatibility/2006">
-        <mc:Choice xmlns:a14="http://schemas.microsoft.com/office/drawing/2010/main" Requires="a14">
+      <mc:AlternateContent xmlns:mc="http://schemas.openxmlformats.org/markup-compatibility/2006" xmlns:a14="http://schemas.microsoft.com/office/drawing/2010/main">
+        <mc:Choice Requires="a14">
           <p:sp>
             <p:nvSpPr>
               <p:cNvPr id="4" name="Rectangle 3"/>
@@ -3514,6 +3519,7 @@
                                   <a:lumOff val="25000"/>
                                 </a:schemeClr>
                               </a:solidFill>
+                              <a:latin typeface="Cambria Math" panose="02040503050406030204" pitchFamily="18" charset="0"/>
                             </a:rPr>
                           </m:ctrlPr>
                         </m:sSubPr>
@@ -3526,6 +3532,7 @@
                                   <a:lumOff val="25000"/>
                                 </a:schemeClr>
                               </a:solidFill>
+                              <a:latin typeface="Cambria Math" panose="02040503050406030204" pitchFamily="18" charset="0"/>
                             </a:rPr>
                             <m:t>𝜎</m:t>
                           </m:r>
@@ -3542,7 +3549,20 @@
                               <a:latin typeface="Cambria Math" panose="02040503050406030204" pitchFamily="18" charset="0"/>
                               <a:ea typeface="Cambria Math" panose="02040503050406030204" pitchFamily="18" charset="0"/>
                             </a:rPr>
-                            <m:t>𝑎𝑑𝑟𝑒𝑠𝑠𝑐𝑜𝑛𝑡𝑎𝑖𝑛𝑠𝑀𝑜𝑛𝑡𝑟𝑒𝑎𝑙</m:t>
+                            <m:t>𝑎𝑑</m:t>
+                          </m:r>
+                          <m:r>
+                            <a:rPr lang="en-US" b="0" i="1" smtClean="0">
+                              <a:solidFill>
+                                <a:schemeClr val="tx1">
+                                  <a:lumMod val="75000"/>
+                                  <a:lumOff val="25000"/>
+                                </a:schemeClr>
+                              </a:solidFill>
+                              <a:latin typeface="Cambria Math" panose="02040503050406030204" pitchFamily="18" charset="0"/>
+                              <a:ea typeface="Cambria Math" panose="02040503050406030204" pitchFamily="18" charset="0"/>
+                            </a:rPr>
+                            <m:t>𝑑</m:t>
                           </m:r>
                           <m:r>
                             <a:rPr lang="en-US" i="1">
@@ -3552,6 +3572,20 @@
                                   <a:lumOff val="25000"/>
                                 </a:schemeClr>
                               </a:solidFill>
+                              <a:latin typeface="Cambria Math" panose="02040503050406030204" pitchFamily="18" charset="0"/>
+                              <a:ea typeface="Cambria Math" panose="02040503050406030204" pitchFamily="18" charset="0"/>
+                            </a:rPr>
+                            <m:t>𝑟𝑒𝑠𝑠𝑐𝑜𝑛𝑡𝑎𝑖𝑛𝑠𝑀𝑜𝑛𝑡𝑟𝑒𝑎𝑙</m:t>
+                          </m:r>
+                          <m:r>
+                            <a:rPr lang="en-US" i="1">
+                              <a:solidFill>
+                                <a:schemeClr val="tx1">
+                                  <a:lumMod val="75000"/>
+                                  <a:lumOff val="25000"/>
+                                </a:schemeClr>
+                              </a:solidFill>
+                              <a:latin typeface="Cambria Math" panose="02040503050406030204" pitchFamily="18" charset="0"/>
                             </a:rPr>
                             <m:t> </m:t>
                           </m:r>
@@ -3572,7 +3606,7 @@
             </p:txBody>
           </p:sp>
         </mc:Choice>
-        <mc:Fallback>
+        <mc:Fallback xmlns="">
           <p:sp>
             <p:nvSpPr>
               <p:cNvPr id="4" name="Rectangle 3"/>
@@ -3592,7 +3626,7 @@
               <a:blipFill rotWithShape="0">
                 <a:blip r:embed="rId2"/>
                 <a:stretch>
-                  <a:fillRect/>
+                  <a:fillRect l="-246"/>
                 </a:stretch>
               </a:blipFill>
             </p:spPr>
@@ -3670,8 +3704,8 @@
           </a:p>
         </p:txBody>
       </p:sp>
-      <mc:AlternateContent xmlns:mc="http://schemas.openxmlformats.org/markup-compatibility/2006">
-        <mc:Choice xmlns:a14="http://schemas.microsoft.com/office/drawing/2010/main" Requires="a14">
+      <mc:AlternateContent xmlns:mc="http://schemas.openxmlformats.org/markup-compatibility/2006" xmlns:a14="http://schemas.microsoft.com/office/drawing/2010/main">
+        <mc:Choice Requires="a14">
           <p:sp>
             <p:nvSpPr>
               <p:cNvPr id="6" name="Rectangle 5"/>
@@ -3725,6 +3759,7 @@
                                   <a:lumOff val="25000"/>
                                 </a:schemeClr>
                               </a:solidFill>
+                              <a:latin typeface="Cambria Math" panose="02040503050406030204" pitchFamily="18" charset="0"/>
                             </a:rPr>
                           </m:ctrlPr>
                         </m:sSubPr>
@@ -3737,6 +3772,7 @@
                                   <a:lumOff val="25000"/>
                                 </a:schemeClr>
                               </a:solidFill>
+                              <a:latin typeface="Cambria Math" panose="02040503050406030204" pitchFamily="18" charset="0"/>
                             </a:rPr>
                             <m:t>𝜎</m:t>
                           </m:r>
@@ -3763,6 +3799,7 @@
                                   <a:lumOff val="25000"/>
                                 </a:schemeClr>
                               </a:solidFill>
+                              <a:latin typeface="Cambria Math" panose="02040503050406030204" pitchFamily="18" charset="0"/>
                             </a:rPr>
                             <m:t>∗</m:t>
                           </m:r>
@@ -3774,6 +3811,7 @@
                                   <a:lumOff val="25000"/>
                                 </a:schemeClr>
                               </a:solidFill>
+                              <a:latin typeface="Cambria Math" panose="02040503050406030204" pitchFamily="18" charset="0"/>
                             </a:rPr>
                             <m:t>𝑖𝑛𝑆𝑡𝑜𝑐𝑘</m:t>
                           </m:r>
@@ -3785,6 +3823,7 @@
                                   <a:lumOff val="25000"/>
                                 </a:schemeClr>
                               </a:solidFill>
+                              <a:latin typeface="Cambria Math" panose="02040503050406030204" pitchFamily="18" charset="0"/>
                             </a:rPr>
                             <m:t>&lt;100</m:t>
                           </m:r>
@@ -3805,7 +3844,7 @@
             </p:txBody>
           </p:sp>
         </mc:Choice>
-        <mc:Fallback>
+        <mc:Fallback xmlns="">
           <p:sp>
             <p:nvSpPr>
               <p:cNvPr id="6" name="Rectangle 5"/>
@@ -4106,8 +4145,8 @@
           </a:fontRef>
         </p:style>
       </p:cxnSp>
-      <mc:AlternateContent xmlns:mc="http://schemas.openxmlformats.org/markup-compatibility/2006">
-        <mc:Choice xmlns:a14="http://schemas.microsoft.com/office/drawing/2010/main" Requires="a14">
+      <mc:AlternateContent xmlns:mc="http://schemas.openxmlformats.org/markup-compatibility/2006" xmlns:a14="http://schemas.microsoft.com/office/drawing/2010/main">
+        <mc:Choice Requires="a14">
           <p:sp>
             <p:nvSpPr>
               <p:cNvPr id="21" name="Rectangle 20"/>
@@ -4209,7 +4248,7 @@
             </p:txBody>
           </p:sp>
         </mc:Choice>
-        <mc:Fallback>
+        <mc:Fallback xmlns="">
           <p:sp>
             <p:nvSpPr>
               <p:cNvPr id="21" name="Rectangle 20"/>
@@ -4248,8 +4287,8 @@
           </p:sp>
         </mc:Fallback>
       </mc:AlternateContent>
-      <mc:AlternateContent xmlns:mc="http://schemas.openxmlformats.org/markup-compatibility/2006">
-        <mc:Choice xmlns:a14="http://schemas.microsoft.com/office/drawing/2010/main" Requires="a14">
+      <mc:AlternateContent xmlns:mc="http://schemas.openxmlformats.org/markup-compatibility/2006" xmlns:a14="http://schemas.microsoft.com/office/drawing/2010/main">
+        <mc:Choice Requires="a14">
           <p:sp>
             <p:nvSpPr>
               <p:cNvPr id="22" name="Rectangle 21"/>
@@ -4375,7 +4414,7 @@
             </p:txBody>
           </p:sp>
         </mc:Choice>
-        <mc:Fallback>
+        <mc:Fallback xmlns="">
           <p:sp>
             <p:nvSpPr>
               <p:cNvPr id="22" name="Rectangle 21"/>
@@ -4414,8 +4453,8 @@
           </p:sp>
         </mc:Fallback>
       </mc:AlternateContent>
-      <mc:AlternateContent xmlns:mc="http://schemas.openxmlformats.org/markup-compatibility/2006">
-        <mc:Choice xmlns:a14="http://schemas.microsoft.com/office/drawing/2010/main" Requires="a14">
+      <mc:AlternateContent xmlns:mc="http://schemas.openxmlformats.org/markup-compatibility/2006" xmlns:a14="http://schemas.microsoft.com/office/drawing/2010/main">
+        <mc:Choice Requires="a14">
           <p:sp>
             <p:nvSpPr>
               <p:cNvPr id="25" name="Rectangle 24"/>
@@ -4541,7 +4580,7 @@
             </p:txBody>
           </p:sp>
         </mc:Choice>
-        <mc:Fallback>
+        <mc:Fallback xmlns="">
           <p:sp>
             <p:nvSpPr>
               <p:cNvPr id="25" name="Rectangle 24"/>
@@ -4621,14 +4660,14 @@
           <p:cNvPr id="33" name="Straight Arrow Connector 32"/>
           <p:cNvCxnSpPr>
             <a:stCxn id="22" idx="3"/>
-            <a:endCxn id="37" idx="1"/>
+            <a:endCxn id="42" idx="1"/>
           </p:cNvCxnSpPr>
           <p:nvPr/>
         </p:nvCxnSpPr>
         <p:spPr>
           <a:xfrm>
             <a:off x="7410905" y="656117"/>
-            <a:ext cx="911223" cy="613838"/>
+            <a:ext cx="3000004" cy="703687"/>
           </a:xfrm>
           <a:prstGeom prst="straightConnector1">
             <a:avLst/>
@@ -4657,14 +4696,14 @@
           <p:cNvPr id="35" name="Straight Arrow Connector 34"/>
           <p:cNvCxnSpPr>
             <a:stCxn id="21" idx="3"/>
-            <a:endCxn id="37" idx="1"/>
+            <a:endCxn id="43" idx="1"/>
           </p:cNvCxnSpPr>
           <p:nvPr/>
         </p:nvCxnSpPr>
         <p:spPr>
-          <a:xfrm flipV="1">
-            <a:off x="7410906" y="1269955"/>
-            <a:ext cx="911222" cy="613838"/>
+          <a:xfrm>
+            <a:off x="7410906" y="1883793"/>
+            <a:ext cx="1313437" cy="960102"/>
           </a:xfrm>
           <a:prstGeom prst="straightConnector1">
             <a:avLst/>
@@ -4692,124 +4731,13 @@
         <mc:Choice xmlns:a14="http://schemas.microsoft.com/office/drawing/2010/main" Requires="a14">
           <p:sp>
             <p:nvSpPr>
-              <p:cNvPr id="37" name="Rectangle 36"/>
-              <p:cNvSpPr/>
-              <p:nvPr/>
-            </p:nvSpPr>
-            <p:spPr>
-              <a:xfrm>
-                <a:off x="8322128" y="963036"/>
-                <a:ext cx="915177" cy="613838"/>
-              </a:xfrm>
-              <a:prstGeom prst="rect">
-                <a:avLst/>
-              </a:prstGeom>
-              <a:noFill/>
-            </p:spPr>
-            <p:style>
-              <a:lnRef idx="2">
-                <a:schemeClr val="accent1">
-                  <a:shade val="50000"/>
-                </a:schemeClr>
-              </a:lnRef>
-              <a:fillRef idx="1">
-                <a:schemeClr val="accent1"/>
-              </a:fillRef>
-              <a:effectRef idx="0">
-                <a:schemeClr val="accent1"/>
-              </a:effectRef>
-              <a:fontRef idx="minor">
-                <a:schemeClr val="lt1"/>
-              </a:fontRef>
-            </p:style>
-            <p:txBody>
-              <a:bodyPr rtlCol="0" anchor="ctr"/>
-              <a:lstStyle/>
-              <a:p>
-                <a:pPr algn="ctr"/>
-                <a14:m>
-                  <m:oMathPara xmlns:m="http://schemas.openxmlformats.org/officeDocument/2006/math">
-                    <m:oMathParaPr>
-                      <m:jc m:val="centerGroup"/>
-                    </m:oMathParaPr>
-                    <m:oMath xmlns:m="http://schemas.openxmlformats.org/officeDocument/2006/math">
-                      <m:r>
-                        <a:rPr lang="en-US" b="0" i="1" smtClean="0">
-                          <a:solidFill>
-                            <a:schemeClr val="tx1">
-                              <a:lumMod val="75000"/>
-                              <a:lumOff val="25000"/>
-                            </a:schemeClr>
-                          </a:solidFill>
-                          <a:latin typeface="Cambria Math" panose="02040503050406030204" pitchFamily="18" charset="0"/>
-                        </a:rPr>
-                        <m:t>×</m:t>
-                      </m:r>
-                    </m:oMath>
-                  </m:oMathPara>
-                </a14:m>
-                <a:endParaRPr lang="en-US" dirty="0">
-                  <a:solidFill>
-                    <a:schemeClr val="tx1">
-                      <a:lumMod val="75000"/>
-                      <a:lumOff val="25000"/>
-                    </a:schemeClr>
-                  </a:solidFill>
-                </a:endParaRPr>
-              </a:p>
-            </p:txBody>
-          </p:sp>
-        </mc:Choice>
-        <mc:Fallback>
-          <p:sp>
-            <p:nvSpPr>
-              <p:cNvPr id="37" name="Rectangle 36"/>
-              <p:cNvSpPr>
-                <a:spLocks noRot="1" noChangeAspect="1" noMove="1" noResize="1" noEditPoints="1" noAdjustHandles="1" noChangeArrowheads="1" noChangeShapeType="1" noTextEdit="1"/>
-              </p:cNvSpPr>
-              <p:nvPr/>
-            </p:nvSpPr>
-            <p:spPr>
-              <a:xfrm>
-                <a:off x="8322128" y="963036"/>
-                <a:ext cx="915177" cy="613838"/>
-              </a:xfrm>
-              <a:prstGeom prst="rect">
-                <a:avLst/>
-              </a:prstGeom>
-              <a:blipFill rotWithShape="0">
-                <a:blip r:embed="rId7"/>
-                <a:stretch>
-                  <a:fillRect/>
-                </a:stretch>
-              </a:blipFill>
-            </p:spPr>
-            <p:txBody>
-              <a:bodyPr/>
-              <a:lstStyle/>
-              <a:p>
-                <a:r>
-                  <a:rPr lang="en-US">
-                    <a:noFill/>
-                  </a:rPr>
-                  <a:t> </a:t>
-                </a:r>
-              </a:p>
-            </p:txBody>
-          </p:sp>
-        </mc:Fallback>
-      </mc:AlternateContent>
-      <mc:AlternateContent xmlns:mc="http://schemas.openxmlformats.org/markup-compatibility/2006">
-        <mc:Choice xmlns:a14="http://schemas.microsoft.com/office/drawing/2010/main" Requires="a14">
-          <p:sp>
-            <p:nvSpPr>
               <p:cNvPr id="42" name="Rectangle 41"/>
               <p:cNvSpPr/>
               <p:nvPr/>
             </p:nvSpPr>
             <p:spPr>
               <a:xfrm>
-                <a:off x="10517674" y="1976107"/>
+                <a:off x="10410909" y="1052885"/>
                 <a:ext cx="1008810" cy="613838"/>
               </a:xfrm>
               <a:prstGeom prst="rect">
@@ -4882,7 +4810,932 @@
             </p:nvSpPr>
             <p:spPr>
               <a:xfrm>
-                <a:off x="10517674" y="1976107"/>
+                <a:off x="10410909" y="1052885"/>
+                <a:ext cx="1008810" cy="613838"/>
+              </a:xfrm>
+              <a:prstGeom prst="rect">
+                <a:avLst/>
+              </a:prstGeom>
+              <a:blipFill rotWithShape="0">
+                <a:blip r:embed="rId7"/>
+                <a:stretch>
+                  <a:fillRect/>
+                </a:stretch>
+              </a:blipFill>
+            </p:spPr>
+            <p:txBody>
+              <a:bodyPr/>
+              <a:lstStyle/>
+              <a:p>
+                <a:r>
+                  <a:rPr lang="en-US">
+                    <a:noFill/>
+                  </a:rPr>
+                  <a:t> </a:t>
+                </a:r>
+              </a:p>
+            </p:txBody>
+          </p:sp>
+        </mc:Fallback>
+      </mc:AlternateContent>
+      <p:cxnSp>
+        <p:nvCxnSpPr>
+          <p:cNvPr id="44" name="Straight Arrow Connector 43"/>
+          <p:cNvCxnSpPr>
+            <a:stCxn id="43" idx="3"/>
+            <a:endCxn id="42" idx="1"/>
+          </p:cNvCxnSpPr>
+          <p:nvPr/>
+        </p:nvCxnSpPr>
+        <p:spPr>
+          <a:xfrm flipV="1">
+            <a:off x="9733153" y="1359804"/>
+            <a:ext cx="677756" cy="1484091"/>
+          </a:xfrm>
+          <a:prstGeom prst="straightConnector1">
+            <a:avLst/>
+          </a:prstGeom>
+          <a:ln>
+            <a:tailEnd type="triangle"/>
+          </a:ln>
+        </p:spPr>
+        <p:style>
+          <a:lnRef idx="1">
+            <a:schemeClr val="accent1"/>
+          </a:lnRef>
+          <a:fillRef idx="0">
+            <a:schemeClr val="accent1"/>
+          </a:fillRef>
+          <a:effectRef idx="0">
+            <a:schemeClr val="accent1"/>
+          </a:effectRef>
+          <a:fontRef idx="minor">
+            <a:schemeClr val="tx1"/>
+          </a:fontRef>
+        </p:style>
+      </p:cxnSp>
+      <p:cxnSp>
+        <p:nvCxnSpPr>
+          <p:cNvPr id="46" name="Straight Arrow Connector 45"/>
+          <p:cNvCxnSpPr>
+            <a:stCxn id="25" idx="3"/>
+            <a:endCxn id="43" idx="1"/>
+          </p:cNvCxnSpPr>
+          <p:nvPr/>
+        </p:nvCxnSpPr>
+        <p:spPr>
+          <a:xfrm flipV="1">
+            <a:off x="7410905" y="2843895"/>
+            <a:ext cx="1313438" cy="265587"/>
+          </a:xfrm>
+          <a:prstGeom prst="straightConnector1">
+            <a:avLst/>
+          </a:prstGeom>
+          <a:ln>
+            <a:tailEnd type="triangle"/>
+          </a:ln>
+        </p:spPr>
+        <p:style>
+          <a:lnRef idx="1">
+            <a:schemeClr val="accent1"/>
+          </a:lnRef>
+          <a:fillRef idx="0">
+            <a:schemeClr val="accent1"/>
+          </a:fillRef>
+          <a:effectRef idx="0">
+            <a:schemeClr val="accent1"/>
+          </a:effectRef>
+          <a:fontRef idx="minor">
+            <a:schemeClr val="tx1"/>
+          </a:fontRef>
+        </p:style>
+      </p:cxnSp>
+      <p:sp>
+        <p:nvSpPr>
+          <p:cNvPr id="104" name="TextBox 103"/>
+          <p:cNvSpPr txBox="1"/>
+          <p:nvPr/>
+        </p:nvSpPr>
+        <p:spPr>
+          <a:xfrm>
+            <a:off x="3387364" y="3519817"/>
+            <a:ext cx="1106393" cy="369332"/>
+          </a:xfrm>
+          <a:prstGeom prst="rect">
+            <a:avLst/>
+          </a:prstGeom>
+          <a:noFill/>
+        </p:spPr>
+        <p:txBody>
+          <a:bodyPr wrap="none" rtlCol="0">
+            <a:spAutoFit/>
+          </a:bodyPr>
+          <a:lstStyle/>
+          <a:p>
+            <a:r>
+              <a:rPr lang="en-US" dirty="0" smtClean="0"/>
+              <a:t>On the fly</a:t>
+            </a:r>
+            <a:endParaRPr lang="en-US" dirty="0"/>
+          </a:p>
+        </p:txBody>
+      </p:sp>
+      <p:sp>
+        <p:nvSpPr>
+          <p:cNvPr id="105" name="TextBox 104"/>
+          <p:cNvSpPr txBox="1"/>
+          <p:nvPr/>
+        </p:nvSpPr>
+        <p:spPr>
+          <a:xfrm>
+            <a:off x="3398218" y="2294127"/>
+            <a:ext cx="1106393" cy="369332"/>
+          </a:xfrm>
+          <a:prstGeom prst="rect">
+            <a:avLst/>
+          </a:prstGeom>
+          <a:noFill/>
+        </p:spPr>
+        <p:txBody>
+          <a:bodyPr wrap="none" rtlCol="0">
+            <a:spAutoFit/>
+          </a:bodyPr>
+          <a:lstStyle/>
+          <a:p>
+            <a:r>
+              <a:rPr lang="en-US" dirty="0" smtClean="0"/>
+              <a:t>On the fly</a:t>
+            </a:r>
+            <a:endParaRPr lang="en-US" dirty="0"/>
+          </a:p>
+        </p:txBody>
+      </p:sp>
+      <p:sp>
+        <p:nvSpPr>
+          <p:cNvPr id="106" name="TextBox 105"/>
+          <p:cNvSpPr txBox="1"/>
+          <p:nvPr/>
+        </p:nvSpPr>
+        <p:spPr>
+          <a:xfrm>
+            <a:off x="5848898" y="2312965"/>
+            <a:ext cx="1106393" cy="369332"/>
+          </a:xfrm>
+          <a:prstGeom prst="rect">
+            <a:avLst/>
+          </a:prstGeom>
+          <a:noFill/>
+        </p:spPr>
+        <p:txBody>
+          <a:bodyPr wrap="none" rtlCol="0">
+            <a:spAutoFit/>
+          </a:bodyPr>
+          <a:lstStyle/>
+          <a:p>
+            <a:r>
+              <a:rPr lang="en-US" dirty="0" smtClean="0"/>
+              <a:t>On the fly</a:t>
+            </a:r>
+            <a:endParaRPr lang="en-US" dirty="0"/>
+          </a:p>
+        </p:txBody>
+      </p:sp>
+      <p:sp>
+        <p:nvSpPr>
+          <p:cNvPr id="107" name="TextBox 106"/>
+          <p:cNvSpPr txBox="1"/>
+          <p:nvPr/>
+        </p:nvSpPr>
+        <p:spPr>
+          <a:xfrm>
+            <a:off x="5848898" y="3536667"/>
+            <a:ext cx="1106393" cy="369332"/>
+          </a:xfrm>
+          <a:prstGeom prst="rect">
+            <a:avLst/>
+          </a:prstGeom>
+          <a:noFill/>
+        </p:spPr>
+        <p:txBody>
+          <a:bodyPr wrap="none" rtlCol="0">
+            <a:spAutoFit/>
+          </a:bodyPr>
+          <a:lstStyle/>
+          <a:p>
+            <a:r>
+              <a:rPr lang="en-US" dirty="0" smtClean="0"/>
+              <a:t>On the fly</a:t>
+            </a:r>
+            <a:endParaRPr lang="en-US" dirty="0"/>
+          </a:p>
+        </p:txBody>
+      </p:sp>
+      <p:sp>
+        <p:nvSpPr>
+          <p:cNvPr id="108" name="TextBox 107"/>
+          <p:cNvSpPr txBox="1"/>
+          <p:nvPr/>
+        </p:nvSpPr>
+        <p:spPr>
+          <a:xfrm>
+            <a:off x="8305386" y="3196651"/>
+            <a:ext cx="1846724" cy="369332"/>
+          </a:xfrm>
+          <a:prstGeom prst="rect">
+            <a:avLst/>
+          </a:prstGeom>
+          <a:noFill/>
+        </p:spPr>
+        <p:txBody>
+          <a:bodyPr wrap="none" rtlCol="0">
+            <a:spAutoFit/>
+          </a:bodyPr>
+          <a:lstStyle/>
+          <a:p>
+            <a:r>
+              <a:rPr lang="en-US" dirty="0" smtClean="0"/>
+              <a:t>Block nested loop</a:t>
+            </a:r>
+            <a:endParaRPr lang="en-US" dirty="0"/>
+          </a:p>
+        </p:txBody>
+      </p:sp>
+      <p:sp>
+        <p:nvSpPr>
+          <p:cNvPr id="109" name="TextBox 108"/>
+          <p:cNvSpPr txBox="1"/>
+          <p:nvPr/>
+        </p:nvSpPr>
+        <p:spPr>
+          <a:xfrm>
+            <a:off x="10152110" y="1615552"/>
+            <a:ext cx="1857688" cy="369332"/>
+          </a:xfrm>
+          <a:prstGeom prst="rect">
+            <a:avLst/>
+          </a:prstGeom>
+          <a:noFill/>
+        </p:spPr>
+        <p:txBody>
+          <a:bodyPr wrap="none" rtlCol="0">
+            <a:spAutoFit/>
+          </a:bodyPr>
+          <a:lstStyle/>
+          <a:p>
+            <a:r>
+              <a:rPr lang="en-US" dirty="0" smtClean="0"/>
+              <a:t>Index nested loop</a:t>
+            </a:r>
+            <a:endParaRPr lang="en-US" dirty="0"/>
+          </a:p>
+        </p:txBody>
+      </p:sp>
+      <p:sp>
+        <p:nvSpPr>
+          <p:cNvPr id="110" name="TextBox 109"/>
+          <p:cNvSpPr txBox="1"/>
+          <p:nvPr/>
+        </p:nvSpPr>
+        <p:spPr>
+          <a:xfrm>
+            <a:off x="5854215" y="931830"/>
+            <a:ext cx="1106393" cy="369332"/>
+          </a:xfrm>
+          <a:prstGeom prst="rect">
+            <a:avLst/>
+          </a:prstGeom>
+          <a:noFill/>
+        </p:spPr>
+        <p:txBody>
+          <a:bodyPr wrap="none" rtlCol="0">
+            <a:spAutoFit/>
+          </a:bodyPr>
+          <a:lstStyle/>
+          <a:p>
+            <a:r>
+              <a:rPr lang="en-US" dirty="0" smtClean="0"/>
+              <a:t>On the fly</a:t>
+            </a:r>
+            <a:endParaRPr lang="en-US" dirty="0"/>
+          </a:p>
+        </p:txBody>
+      </p:sp>
+      <p:sp>
+        <p:nvSpPr>
+          <p:cNvPr id="111" name="TextBox 110"/>
+          <p:cNvSpPr txBox="1"/>
+          <p:nvPr/>
+        </p:nvSpPr>
+        <p:spPr>
+          <a:xfrm>
+            <a:off x="4861606" y="2576855"/>
+            <a:ext cx="764953" cy="276999"/>
+          </a:xfrm>
+          <a:prstGeom prst="rect">
+            <a:avLst/>
+          </a:prstGeom>
+          <a:noFill/>
+        </p:spPr>
+        <p:txBody>
+          <a:bodyPr wrap="none" rtlCol="0">
+            <a:spAutoFit/>
+          </a:bodyPr>
+          <a:lstStyle/>
+          <a:p>
+            <a:r>
+              <a:rPr lang="en-US" sz="1200" dirty="0" smtClean="0">
+                <a:solidFill>
+                  <a:srgbClr val="FF0000"/>
+                </a:solidFill>
+              </a:rPr>
+              <a:t>Pipelined</a:t>
+            </a:r>
+            <a:endParaRPr lang="en-US" sz="1200" dirty="0">
+              <a:solidFill>
+                <a:srgbClr val="FF0000"/>
+              </a:solidFill>
+            </a:endParaRPr>
+          </a:p>
+        </p:txBody>
+      </p:sp>
+      <p:sp>
+        <p:nvSpPr>
+          <p:cNvPr id="112" name="TextBox 111"/>
+          <p:cNvSpPr txBox="1"/>
+          <p:nvPr/>
+        </p:nvSpPr>
+        <p:spPr>
+          <a:xfrm>
+            <a:off x="4861606" y="1296898"/>
+            <a:ext cx="764953" cy="276999"/>
+          </a:xfrm>
+          <a:prstGeom prst="rect">
+            <a:avLst/>
+          </a:prstGeom>
+          <a:noFill/>
+        </p:spPr>
+        <p:txBody>
+          <a:bodyPr wrap="none" rtlCol="0">
+            <a:spAutoFit/>
+          </a:bodyPr>
+          <a:lstStyle/>
+          <a:p>
+            <a:r>
+              <a:rPr lang="en-US" sz="1200" dirty="0" smtClean="0">
+                <a:solidFill>
+                  <a:srgbClr val="FF0000"/>
+                </a:solidFill>
+              </a:rPr>
+              <a:t>Pipelined</a:t>
+            </a:r>
+            <a:endParaRPr lang="en-US" sz="1200" dirty="0">
+              <a:solidFill>
+                <a:srgbClr val="FF0000"/>
+              </a:solidFill>
+            </a:endParaRPr>
+          </a:p>
+        </p:txBody>
+      </p:sp>
+      <p:sp>
+        <p:nvSpPr>
+          <p:cNvPr id="113" name="TextBox 112"/>
+          <p:cNvSpPr txBox="1"/>
+          <p:nvPr/>
+        </p:nvSpPr>
+        <p:spPr>
+          <a:xfrm>
+            <a:off x="8430298" y="610280"/>
+            <a:ext cx="764953" cy="276999"/>
+          </a:xfrm>
+          <a:prstGeom prst="rect">
+            <a:avLst/>
+          </a:prstGeom>
+          <a:noFill/>
+        </p:spPr>
+        <p:txBody>
+          <a:bodyPr wrap="none" rtlCol="0">
+            <a:spAutoFit/>
+          </a:bodyPr>
+          <a:lstStyle/>
+          <a:p>
+            <a:r>
+              <a:rPr lang="en-US" sz="1200" dirty="0" smtClean="0">
+                <a:solidFill>
+                  <a:srgbClr val="FF0000"/>
+                </a:solidFill>
+              </a:rPr>
+              <a:t>Pipelined</a:t>
+            </a:r>
+            <a:endParaRPr lang="en-US" sz="1200" dirty="0">
+              <a:solidFill>
+                <a:srgbClr val="FF0000"/>
+              </a:solidFill>
+            </a:endParaRPr>
+          </a:p>
+        </p:txBody>
+      </p:sp>
+      <p:sp>
+        <p:nvSpPr>
+          <p:cNvPr id="114" name="TextBox 113"/>
+          <p:cNvSpPr txBox="1"/>
+          <p:nvPr/>
+        </p:nvSpPr>
+        <p:spPr>
+          <a:xfrm>
+            <a:off x="7766209" y="1923541"/>
+            <a:ext cx="764953" cy="276999"/>
+          </a:xfrm>
+          <a:prstGeom prst="rect">
+            <a:avLst/>
+          </a:prstGeom>
+          <a:noFill/>
+        </p:spPr>
+        <p:txBody>
+          <a:bodyPr wrap="none" rtlCol="0">
+            <a:spAutoFit/>
+          </a:bodyPr>
+          <a:lstStyle/>
+          <a:p>
+            <a:r>
+              <a:rPr lang="en-US" sz="1200" dirty="0" smtClean="0">
+                <a:solidFill>
+                  <a:srgbClr val="FF0000"/>
+                </a:solidFill>
+              </a:rPr>
+              <a:t>Pipelined</a:t>
+            </a:r>
+            <a:endParaRPr lang="en-US" sz="1200" dirty="0">
+              <a:solidFill>
+                <a:srgbClr val="FF0000"/>
+              </a:solidFill>
+            </a:endParaRPr>
+          </a:p>
+        </p:txBody>
+      </p:sp>
+      <p:sp>
+        <p:nvSpPr>
+          <p:cNvPr id="116" name="TextBox 115"/>
+          <p:cNvSpPr txBox="1"/>
+          <p:nvPr/>
+        </p:nvSpPr>
+        <p:spPr>
+          <a:xfrm>
+            <a:off x="9350676" y="1745292"/>
+            <a:ext cx="764953" cy="276999"/>
+          </a:xfrm>
+          <a:prstGeom prst="rect">
+            <a:avLst/>
+          </a:prstGeom>
+          <a:noFill/>
+        </p:spPr>
+        <p:txBody>
+          <a:bodyPr wrap="none" rtlCol="0">
+            <a:spAutoFit/>
+          </a:bodyPr>
+          <a:lstStyle/>
+          <a:p>
+            <a:r>
+              <a:rPr lang="en-US" sz="1200" dirty="0" smtClean="0">
+                <a:solidFill>
+                  <a:srgbClr val="FF0000"/>
+                </a:solidFill>
+              </a:rPr>
+              <a:t>Pipelined</a:t>
+            </a:r>
+            <a:endParaRPr lang="en-US" sz="1200" dirty="0">
+              <a:solidFill>
+                <a:srgbClr val="FF0000"/>
+              </a:solidFill>
+            </a:endParaRPr>
+          </a:p>
+        </p:txBody>
+      </p:sp>
+      <p:sp>
+        <p:nvSpPr>
+          <p:cNvPr id="117" name="TextBox 116"/>
+          <p:cNvSpPr txBox="1"/>
+          <p:nvPr/>
+        </p:nvSpPr>
+        <p:spPr>
+          <a:xfrm>
+            <a:off x="7626528" y="2687211"/>
+            <a:ext cx="764953" cy="276999"/>
+          </a:xfrm>
+          <a:prstGeom prst="rect">
+            <a:avLst/>
+          </a:prstGeom>
+          <a:noFill/>
+        </p:spPr>
+        <p:txBody>
+          <a:bodyPr wrap="none" rtlCol="0">
+            <a:spAutoFit/>
+          </a:bodyPr>
+          <a:lstStyle/>
+          <a:p>
+            <a:r>
+              <a:rPr lang="en-US" sz="1200" dirty="0" smtClean="0">
+                <a:solidFill>
+                  <a:srgbClr val="FF0000"/>
+                </a:solidFill>
+              </a:rPr>
+              <a:t>Pipelined</a:t>
+            </a:r>
+            <a:endParaRPr lang="en-US" sz="1200" dirty="0">
+              <a:solidFill>
+                <a:srgbClr val="FF0000"/>
+              </a:solidFill>
+            </a:endParaRPr>
+          </a:p>
+        </p:txBody>
+      </p:sp>
+      <p:sp>
+        <p:nvSpPr>
+          <p:cNvPr id="118" name="TextBox 117"/>
+          <p:cNvSpPr txBox="1"/>
+          <p:nvPr/>
+        </p:nvSpPr>
+        <p:spPr>
+          <a:xfrm>
+            <a:off x="4990629" y="2169340"/>
+            <a:ext cx="420308" cy="276999"/>
+          </a:xfrm>
+          <a:prstGeom prst="rect">
+            <a:avLst/>
+          </a:prstGeom>
+          <a:noFill/>
+        </p:spPr>
+        <p:txBody>
+          <a:bodyPr wrap="none" rtlCol="0">
+            <a:spAutoFit/>
+          </a:bodyPr>
+          <a:lstStyle/>
+          <a:p>
+            <a:r>
+              <a:rPr lang="en-US" sz="1200" dirty="0" smtClean="0">
+                <a:solidFill>
+                  <a:srgbClr val="00B050"/>
+                </a:solidFill>
+              </a:rPr>
+              <a:t>100</a:t>
+            </a:r>
+            <a:endParaRPr lang="en-US" sz="1200" dirty="0">
+              <a:solidFill>
+                <a:srgbClr val="00B050"/>
+              </a:solidFill>
+            </a:endParaRPr>
+          </a:p>
+        </p:txBody>
+      </p:sp>
+      <p:sp>
+        <p:nvSpPr>
+          <p:cNvPr id="119" name="TextBox 118"/>
+          <p:cNvSpPr txBox="1"/>
+          <p:nvPr/>
+        </p:nvSpPr>
+        <p:spPr>
+          <a:xfrm>
+            <a:off x="4861606" y="3431360"/>
+            <a:ext cx="612668" cy="276999"/>
+          </a:xfrm>
+          <a:prstGeom prst="rect">
+            <a:avLst/>
+          </a:prstGeom>
+          <a:noFill/>
+        </p:spPr>
+        <p:txBody>
+          <a:bodyPr wrap="none" rtlCol="0">
+            <a:spAutoFit/>
+          </a:bodyPr>
+          <a:lstStyle/>
+          <a:p>
+            <a:r>
+              <a:rPr lang="en-US" sz="1200" dirty="0" smtClean="0">
+                <a:solidFill>
+                  <a:srgbClr val="00B050"/>
+                </a:solidFill>
+              </a:rPr>
+              <a:t>80 000</a:t>
+            </a:r>
+            <a:endParaRPr lang="en-US" sz="1200" dirty="0">
+              <a:solidFill>
+                <a:srgbClr val="00B050"/>
+              </a:solidFill>
+            </a:endParaRPr>
+          </a:p>
+        </p:txBody>
+      </p:sp>
+      <p:sp>
+        <p:nvSpPr>
+          <p:cNvPr id="120" name="TextBox 119"/>
+          <p:cNvSpPr txBox="1"/>
+          <p:nvPr/>
+        </p:nvSpPr>
+        <p:spPr>
+          <a:xfrm>
+            <a:off x="8506440" y="1037309"/>
+            <a:ext cx="612668" cy="276999"/>
+          </a:xfrm>
+          <a:prstGeom prst="rect">
+            <a:avLst/>
+          </a:prstGeom>
+          <a:noFill/>
+        </p:spPr>
+        <p:txBody>
+          <a:bodyPr wrap="none" rtlCol="0">
+            <a:spAutoFit/>
+          </a:bodyPr>
+          <a:lstStyle/>
+          <a:p>
+            <a:r>
+              <a:rPr lang="en-US" sz="1200" dirty="0" smtClean="0">
+                <a:solidFill>
+                  <a:srgbClr val="00B050"/>
+                </a:solidFill>
+              </a:rPr>
+              <a:t>20 000</a:t>
+            </a:r>
+            <a:endParaRPr lang="en-US" sz="1200" dirty="0">
+              <a:solidFill>
+                <a:srgbClr val="00B050"/>
+              </a:solidFill>
+            </a:endParaRPr>
+          </a:p>
+        </p:txBody>
+      </p:sp>
+      <p:sp>
+        <p:nvSpPr>
+          <p:cNvPr id="121" name="TextBox 120"/>
+          <p:cNvSpPr txBox="1"/>
+          <p:nvPr/>
+        </p:nvSpPr>
+        <p:spPr>
+          <a:xfrm>
+            <a:off x="7537412" y="2135493"/>
+            <a:ext cx="420308" cy="276999"/>
+          </a:xfrm>
+          <a:prstGeom prst="rect">
+            <a:avLst/>
+          </a:prstGeom>
+          <a:noFill/>
+        </p:spPr>
+        <p:txBody>
+          <a:bodyPr wrap="none" rtlCol="0">
+            <a:spAutoFit/>
+          </a:bodyPr>
+          <a:lstStyle/>
+          <a:p>
+            <a:r>
+              <a:rPr lang="en-US" sz="1200" dirty="0" smtClean="0">
+                <a:solidFill>
+                  <a:srgbClr val="00B050"/>
+                </a:solidFill>
+              </a:rPr>
+              <a:t>100</a:t>
+            </a:r>
+            <a:endParaRPr lang="en-US" sz="1200" dirty="0">
+              <a:solidFill>
+                <a:srgbClr val="00B050"/>
+              </a:solidFill>
+            </a:endParaRPr>
+          </a:p>
+        </p:txBody>
+      </p:sp>
+      <p:sp>
+        <p:nvSpPr>
+          <p:cNvPr id="122" name="TextBox 121"/>
+          <p:cNvSpPr txBox="1"/>
+          <p:nvPr/>
+        </p:nvSpPr>
+        <p:spPr>
+          <a:xfrm>
+            <a:off x="8015794" y="2994130"/>
+            <a:ext cx="612668" cy="276999"/>
+          </a:xfrm>
+          <a:prstGeom prst="rect">
+            <a:avLst/>
+          </a:prstGeom>
+          <a:noFill/>
+        </p:spPr>
+        <p:txBody>
+          <a:bodyPr wrap="none" rtlCol="0">
+            <a:spAutoFit/>
+          </a:bodyPr>
+          <a:lstStyle/>
+          <a:p>
+            <a:r>
+              <a:rPr lang="en-US" sz="1200" dirty="0" smtClean="0">
+                <a:solidFill>
+                  <a:srgbClr val="00B050"/>
+                </a:solidFill>
+              </a:rPr>
+              <a:t>80 000</a:t>
+            </a:r>
+            <a:endParaRPr lang="en-US" sz="1200" dirty="0">
+              <a:solidFill>
+                <a:srgbClr val="00B050"/>
+              </a:solidFill>
+            </a:endParaRPr>
+          </a:p>
+        </p:txBody>
+      </p:sp>
+      <p:sp>
+        <p:nvSpPr>
+          <p:cNvPr id="124" name="TextBox 123"/>
+          <p:cNvSpPr txBox="1"/>
+          <p:nvPr/>
+        </p:nvSpPr>
+        <p:spPr>
+          <a:xfrm>
+            <a:off x="3491671" y="698265"/>
+            <a:ext cx="612668" cy="276999"/>
+          </a:xfrm>
+          <a:prstGeom prst="rect">
+            <a:avLst/>
+          </a:prstGeom>
+          <a:noFill/>
+        </p:spPr>
+        <p:txBody>
+          <a:bodyPr wrap="none" rtlCol="0">
+            <a:spAutoFit/>
+          </a:bodyPr>
+          <a:lstStyle/>
+          <a:p>
+            <a:r>
+              <a:rPr lang="en-US" sz="1200" dirty="0" smtClean="0">
+                <a:solidFill>
+                  <a:srgbClr val="00B050"/>
+                </a:solidFill>
+              </a:rPr>
+              <a:t>20 000</a:t>
+            </a:r>
+            <a:endParaRPr lang="en-US" sz="1200" dirty="0">
+              <a:solidFill>
+                <a:srgbClr val="00B050"/>
+              </a:solidFill>
+            </a:endParaRPr>
+          </a:p>
+        </p:txBody>
+      </p:sp>
+      <p:sp>
+        <p:nvSpPr>
+          <p:cNvPr id="125" name="TextBox 124"/>
+          <p:cNvSpPr txBox="1"/>
+          <p:nvPr/>
+        </p:nvSpPr>
+        <p:spPr>
+          <a:xfrm>
+            <a:off x="1955348" y="2111231"/>
+            <a:ext cx="534121" cy="276999"/>
+          </a:xfrm>
+          <a:prstGeom prst="rect">
+            <a:avLst/>
+          </a:prstGeom>
+          <a:noFill/>
+        </p:spPr>
+        <p:txBody>
+          <a:bodyPr wrap="none" rtlCol="0">
+            <a:spAutoFit/>
+          </a:bodyPr>
+          <a:lstStyle/>
+          <a:p>
+            <a:r>
+              <a:rPr lang="en-US" sz="1200" dirty="0" smtClean="0">
+                <a:solidFill>
+                  <a:srgbClr val="00B050"/>
+                </a:solidFill>
+              </a:rPr>
+              <a:t>1 000</a:t>
+            </a:r>
+            <a:endParaRPr lang="en-US" sz="1200" dirty="0">
+              <a:solidFill>
+                <a:srgbClr val="00B050"/>
+              </a:solidFill>
+            </a:endParaRPr>
+          </a:p>
+        </p:txBody>
+      </p:sp>
+      <p:sp>
+        <p:nvSpPr>
+          <p:cNvPr id="126" name="TextBox 125"/>
+          <p:cNvSpPr txBox="1"/>
+          <p:nvPr/>
+        </p:nvSpPr>
+        <p:spPr>
+          <a:xfrm>
+            <a:off x="1846014" y="3427484"/>
+            <a:ext cx="805029" cy="276999"/>
+          </a:xfrm>
+          <a:prstGeom prst="rect">
+            <a:avLst/>
+          </a:prstGeom>
+          <a:noFill/>
+        </p:spPr>
+        <p:txBody>
+          <a:bodyPr wrap="none" rtlCol="0">
+            <a:spAutoFit/>
+          </a:bodyPr>
+          <a:lstStyle/>
+          <a:p>
+            <a:r>
+              <a:rPr lang="en-US" sz="1200" dirty="0" smtClean="0">
+                <a:solidFill>
+                  <a:srgbClr val="00B050"/>
+                </a:solidFill>
+              </a:rPr>
+              <a:t>4 000 000</a:t>
+            </a:r>
+            <a:endParaRPr lang="en-US" sz="1200" dirty="0">
+              <a:solidFill>
+                <a:srgbClr val="00B050"/>
+              </a:solidFill>
+            </a:endParaRPr>
+          </a:p>
+        </p:txBody>
+      </p:sp>
+      <mc:AlternateContent xmlns:mc="http://schemas.openxmlformats.org/markup-compatibility/2006">
+        <mc:Choice xmlns:a14="http://schemas.microsoft.com/office/drawing/2010/main" Requires="a14">
+          <p:sp>
+            <p:nvSpPr>
+              <p:cNvPr id="43" name="Rectangle 42"/>
+              <p:cNvSpPr/>
+              <p:nvPr/>
+            </p:nvSpPr>
+            <p:spPr>
+              <a:xfrm>
+                <a:off x="8724343" y="2536976"/>
+                <a:ext cx="1008810" cy="613838"/>
+              </a:xfrm>
+              <a:prstGeom prst="rect">
+                <a:avLst/>
+              </a:prstGeom>
+              <a:noFill/>
+            </p:spPr>
+            <p:style>
+              <a:lnRef idx="2">
+                <a:schemeClr val="accent1">
+                  <a:shade val="50000"/>
+                </a:schemeClr>
+              </a:lnRef>
+              <a:fillRef idx="1">
+                <a:schemeClr val="accent1"/>
+              </a:fillRef>
+              <a:effectRef idx="0">
+                <a:schemeClr val="accent1"/>
+              </a:effectRef>
+              <a:fontRef idx="minor">
+                <a:schemeClr val="lt1"/>
+              </a:fontRef>
+            </p:style>
+            <p:txBody>
+              <a:bodyPr rtlCol="0" anchor="ctr"/>
+              <a:lstStyle/>
+              <a:p>
+                <a:pPr algn="ctr"/>
+                <a14:m>
+                  <m:oMathPara xmlns:m="http://schemas.openxmlformats.org/officeDocument/2006/math">
+                    <m:oMathParaPr>
+                      <m:jc m:val="centerGroup"/>
+                    </m:oMathParaPr>
+                    <m:oMath xmlns:m="http://schemas.openxmlformats.org/officeDocument/2006/math">
+                      <m:r>
+                        <a:rPr lang="en-US" i="1" smtClean="0">
+                          <a:solidFill>
+                            <a:schemeClr val="tx1">
+                              <a:lumMod val="75000"/>
+                              <a:lumOff val="25000"/>
+                            </a:schemeClr>
+                          </a:solidFill>
+                          <a:latin typeface="Cambria Math" panose="02040503050406030204" pitchFamily="18" charset="0"/>
+                        </a:rPr>
+                        <m:t>⋈</m:t>
+                      </m:r>
+                    </m:oMath>
+                  </m:oMathPara>
+                </a14:m>
+                <a:endParaRPr lang="en-US" dirty="0">
+                  <a:solidFill>
+                    <a:schemeClr val="tx1">
+                      <a:lumMod val="75000"/>
+                      <a:lumOff val="25000"/>
+                    </a:schemeClr>
+                  </a:solidFill>
+                </a:endParaRPr>
+              </a:p>
+            </p:txBody>
+          </p:sp>
+        </mc:Choice>
+        <mc:Fallback>
+          <p:sp>
+            <p:nvSpPr>
+              <p:cNvPr id="43" name="Rectangle 42"/>
+              <p:cNvSpPr>
+                <a:spLocks noRot="1" noChangeAspect="1" noMove="1" noResize="1" noEditPoints="1" noAdjustHandles="1" noChangeArrowheads="1" noChangeShapeType="1" noTextEdit="1"/>
+              </p:cNvSpPr>
+              <p:nvPr/>
+            </p:nvSpPr>
+            <p:spPr>
+              <a:xfrm>
+                <a:off x="8724343" y="2536976"/>
                 <a:ext cx="1008810" cy="613838"/>
               </a:xfrm>
               <a:prstGeom prst="rect">
@@ -4912,17 +5765,16 @@
       </mc:AlternateContent>
       <p:cxnSp>
         <p:nvCxnSpPr>
-          <p:cNvPr id="44" name="Straight Arrow Connector 43"/>
+          <p:cNvPr id="16" name="Straight Arrow Connector 15"/>
           <p:cNvCxnSpPr>
-            <a:stCxn id="37" idx="3"/>
-            <a:endCxn id="42" idx="1"/>
+            <a:stCxn id="42" idx="3"/>
           </p:cNvCxnSpPr>
           <p:nvPr/>
         </p:nvCxnSpPr>
         <p:spPr>
           <a:xfrm>
-            <a:off x="9237305" y="1269955"/>
-            <a:ext cx="1280369" cy="1013071"/>
+            <a:off x="11419719" y="1359804"/>
+            <a:ext cx="661690" cy="0"/>
           </a:xfrm>
           <a:prstGeom prst="straightConnector1">
             <a:avLst/>
@@ -4946,527 +5798,15 @@
           </a:fontRef>
         </p:style>
       </p:cxnSp>
-      <p:cxnSp>
-        <p:nvCxnSpPr>
-          <p:cNvPr id="46" name="Straight Arrow Connector 45"/>
-          <p:cNvCxnSpPr>
-            <a:stCxn id="25" idx="3"/>
-            <a:endCxn id="42" idx="1"/>
-          </p:cNvCxnSpPr>
-          <p:nvPr/>
-        </p:nvCxnSpPr>
-        <p:spPr>
-          <a:xfrm flipV="1">
-            <a:off x="7410905" y="2283026"/>
-            <a:ext cx="3106769" cy="826456"/>
-          </a:xfrm>
-          <a:prstGeom prst="straightConnector1">
-            <a:avLst/>
-          </a:prstGeom>
-          <a:ln>
-            <a:tailEnd type="triangle"/>
-          </a:ln>
-        </p:spPr>
-        <p:style>
-          <a:lnRef idx="1">
-            <a:schemeClr val="accent1"/>
-          </a:lnRef>
-          <a:fillRef idx="0">
-            <a:schemeClr val="accent1"/>
-          </a:fillRef>
-          <a:effectRef idx="0">
-            <a:schemeClr val="accent1"/>
-          </a:effectRef>
-          <a:fontRef idx="minor">
-            <a:schemeClr val="tx1"/>
-          </a:fontRef>
-        </p:style>
-      </p:cxnSp>
-      <p:sp>
-        <p:nvSpPr>
-          <p:cNvPr id="104" name="TextBox 103"/>
+      <p:sp>
+        <p:nvSpPr>
+          <p:cNvPr id="52" name="TextBox 51"/>
           <p:cNvSpPr txBox="1"/>
           <p:nvPr/>
         </p:nvSpPr>
         <p:spPr>
           <a:xfrm>
-            <a:off x="3387364" y="3519817"/>
-            <a:ext cx="1106393" cy="369332"/>
-          </a:xfrm>
-          <a:prstGeom prst="rect">
-            <a:avLst/>
-          </a:prstGeom>
-          <a:noFill/>
-        </p:spPr>
-        <p:txBody>
-          <a:bodyPr wrap="none" rtlCol="0">
-            <a:spAutoFit/>
-          </a:bodyPr>
-          <a:lstStyle/>
-          <a:p>
-            <a:r>
-              <a:rPr lang="en-US" dirty="0" smtClean="0"/>
-              <a:t>On the fly</a:t>
-            </a:r>
-            <a:endParaRPr lang="en-US" dirty="0"/>
-          </a:p>
-        </p:txBody>
-      </p:sp>
-      <p:sp>
-        <p:nvSpPr>
-          <p:cNvPr id="105" name="TextBox 104"/>
-          <p:cNvSpPr txBox="1"/>
-          <p:nvPr/>
-        </p:nvSpPr>
-        <p:spPr>
-          <a:xfrm>
-            <a:off x="3398218" y="2294127"/>
-            <a:ext cx="1106393" cy="369332"/>
-          </a:xfrm>
-          <a:prstGeom prst="rect">
-            <a:avLst/>
-          </a:prstGeom>
-          <a:noFill/>
-        </p:spPr>
-        <p:txBody>
-          <a:bodyPr wrap="none" rtlCol="0">
-            <a:spAutoFit/>
-          </a:bodyPr>
-          <a:lstStyle/>
-          <a:p>
-            <a:r>
-              <a:rPr lang="en-US" dirty="0" smtClean="0"/>
-              <a:t>On the fly</a:t>
-            </a:r>
-            <a:endParaRPr lang="en-US" dirty="0"/>
-          </a:p>
-        </p:txBody>
-      </p:sp>
-      <p:sp>
-        <p:nvSpPr>
-          <p:cNvPr id="106" name="TextBox 105"/>
-          <p:cNvSpPr txBox="1"/>
-          <p:nvPr/>
-        </p:nvSpPr>
-        <p:spPr>
-          <a:xfrm>
-            <a:off x="5848898" y="2312965"/>
-            <a:ext cx="1106393" cy="369332"/>
-          </a:xfrm>
-          <a:prstGeom prst="rect">
-            <a:avLst/>
-          </a:prstGeom>
-          <a:noFill/>
-        </p:spPr>
-        <p:txBody>
-          <a:bodyPr wrap="none" rtlCol="0">
-            <a:spAutoFit/>
-          </a:bodyPr>
-          <a:lstStyle/>
-          <a:p>
-            <a:r>
-              <a:rPr lang="en-US" dirty="0" smtClean="0"/>
-              <a:t>On the fly</a:t>
-            </a:r>
-            <a:endParaRPr lang="en-US" dirty="0"/>
-          </a:p>
-        </p:txBody>
-      </p:sp>
-      <p:sp>
-        <p:nvSpPr>
-          <p:cNvPr id="107" name="TextBox 106"/>
-          <p:cNvSpPr txBox="1"/>
-          <p:nvPr/>
-        </p:nvSpPr>
-        <p:spPr>
-          <a:xfrm>
-            <a:off x="5848898" y="3536667"/>
-            <a:ext cx="1106393" cy="369332"/>
-          </a:xfrm>
-          <a:prstGeom prst="rect">
-            <a:avLst/>
-          </a:prstGeom>
-          <a:noFill/>
-        </p:spPr>
-        <p:txBody>
-          <a:bodyPr wrap="none" rtlCol="0">
-            <a:spAutoFit/>
-          </a:bodyPr>
-          <a:lstStyle/>
-          <a:p>
-            <a:r>
-              <a:rPr lang="en-US" dirty="0" smtClean="0"/>
-              <a:t>On the fly</a:t>
-            </a:r>
-            <a:endParaRPr lang="en-US" dirty="0"/>
-          </a:p>
-        </p:txBody>
-      </p:sp>
-      <p:sp>
-        <p:nvSpPr>
-          <p:cNvPr id="108" name="TextBox 107"/>
-          <p:cNvSpPr txBox="1"/>
-          <p:nvPr/>
-        </p:nvSpPr>
-        <p:spPr>
-          <a:xfrm>
-            <a:off x="8022855" y="1556533"/>
-            <a:ext cx="1846724" cy="369332"/>
-          </a:xfrm>
-          <a:prstGeom prst="rect">
-            <a:avLst/>
-          </a:prstGeom>
-          <a:noFill/>
-        </p:spPr>
-        <p:txBody>
-          <a:bodyPr wrap="none" rtlCol="0">
-            <a:spAutoFit/>
-          </a:bodyPr>
-          <a:lstStyle/>
-          <a:p>
-            <a:r>
-              <a:rPr lang="en-US" dirty="0" smtClean="0"/>
-              <a:t>Block nested loop</a:t>
-            </a:r>
-            <a:endParaRPr lang="en-US" dirty="0"/>
-          </a:p>
-        </p:txBody>
-      </p:sp>
-      <p:sp>
-        <p:nvSpPr>
-          <p:cNvPr id="109" name="TextBox 108"/>
-          <p:cNvSpPr txBox="1"/>
-          <p:nvPr/>
-        </p:nvSpPr>
-        <p:spPr>
-          <a:xfrm>
-            <a:off x="10209324" y="2634274"/>
-            <a:ext cx="1857688" cy="369332"/>
-          </a:xfrm>
-          <a:prstGeom prst="rect">
-            <a:avLst/>
-          </a:prstGeom>
-          <a:noFill/>
-        </p:spPr>
-        <p:txBody>
-          <a:bodyPr wrap="none" rtlCol="0">
-            <a:spAutoFit/>
-          </a:bodyPr>
-          <a:lstStyle/>
-          <a:p>
-            <a:r>
-              <a:rPr lang="en-US" dirty="0" smtClean="0"/>
-              <a:t>Index nested loop</a:t>
-            </a:r>
-            <a:endParaRPr lang="en-US" dirty="0"/>
-          </a:p>
-        </p:txBody>
-      </p:sp>
-      <p:sp>
-        <p:nvSpPr>
-          <p:cNvPr id="110" name="TextBox 109"/>
-          <p:cNvSpPr txBox="1"/>
-          <p:nvPr/>
-        </p:nvSpPr>
-        <p:spPr>
-          <a:xfrm>
-            <a:off x="5854215" y="931830"/>
-            <a:ext cx="1106393" cy="369332"/>
-          </a:xfrm>
-          <a:prstGeom prst="rect">
-            <a:avLst/>
-          </a:prstGeom>
-          <a:noFill/>
-        </p:spPr>
-        <p:txBody>
-          <a:bodyPr wrap="none" rtlCol="0">
-            <a:spAutoFit/>
-          </a:bodyPr>
-          <a:lstStyle/>
-          <a:p>
-            <a:r>
-              <a:rPr lang="en-US" dirty="0" smtClean="0"/>
-              <a:t>On the fly</a:t>
-            </a:r>
-            <a:endParaRPr lang="en-US" dirty="0"/>
-          </a:p>
-        </p:txBody>
-      </p:sp>
-      <p:sp>
-        <p:nvSpPr>
-          <p:cNvPr id="111" name="TextBox 110"/>
-          <p:cNvSpPr txBox="1"/>
-          <p:nvPr/>
-        </p:nvSpPr>
-        <p:spPr>
-          <a:xfrm>
-            <a:off x="4861606" y="2576855"/>
-            <a:ext cx="764953" cy="276999"/>
-          </a:xfrm>
-          <a:prstGeom prst="rect">
-            <a:avLst/>
-          </a:prstGeom>
-          <a:noFill/>
-        </p:spPr>
-        <p:txBody>
-          <a:bodyPr wrap="none" rtlCol="0">
-            <a:spAutoFit/>
-          </a:bodyPr>
-          <a:lstStyle/>
-          <a:p>
-            <a:r>
-              <a:rPr lang="en-US" sz="1200" dirty="0" smtClean="0">
-                <a:solidFill>
-                  <a:srgbClr val="FF0000"/>
-                </a:solidFill>
-              </a:rPr>
-              <a:t>Pipelined</a:t>
-            </a:r>
-            <a:endParaRPr lang="en-US" sz="1200" dirty="0">
-              <a:solidFill>
-                <a:srgbClr val="FF0000"/>
-              </a:solidFill>
-            </a:endParaRPr>
-          </a:p>
-        </p:txBody>
-      </p:sp>
-      <p:sp>
-        <p:nvSpPr>
-          <p:cNvPr id="112" name="TextBox 111"/>
-          <p:cNvSpPr txBox="1"/>
-          <p:nvPr/>
-        </p:nvSpPr>
-        <p:spPr>
-          <a:xfrm>
-            <a:off x="4861606" y="1296898"/>
-            <a:ext cx="764953" cy="276999"/>
-          </a:xfrm>
-          <a:prstGeom prst="rect">
-            <a:avLst/>
-          </a:prstGeom>
-          <a:noFill/>
-        </p:spPr>
-        <p:txBody>
-          <a:bodyPr wrap="none" rtlCol="0">
-            <a:spAutoFit/>
-          </a:bodyPr>
-          <a:lstStyle/>
-          <a:p>
-            <a:r>
-              <a:rPr lang="en-US" sz="1200" dirty="0" smtClean="0">
-                <a:solidFill>
-                  <a:srgbClr val="FF0000"/>
-                </a:solidFill>
-              </a:rPr>
-              <a:t>Pipelined</a:t>
-            </a:r>
-            <a:endParaRPr lang="en-US" sz="1200" dirty="0">
-              <a:solidFill>
-                <a:srgbClr val="FF0000"/>
-              </a:solidFill>
-            </a:endParaRPr>
-          </a:p>
-        </p:txBody>
-      </p:sp>
-      <p:sp>
-        <p:nvSpPr>
-          <p:cNvPr id="113" name="TextBox 112"/>
-          <p:cNvSpPr txBox="1"/>
-          <p:nvPr/>
-        </p:nvSpPr>
-        <p:spPr>
-          <a:xfrm>
-            <a:off x="7541716" y="546583"/>
-            <a:ext cx="764953" cy="276999"/>
-          </a:xfrm>
-          <a:prstGeom prst="rect">
-            <a:avLst/>
-          </a:prstGeom>
-          <a:noFill/>
-        </p:spPr>
-        <p:txBody>
-          <a:bodyPr wrap="none" rtlCol="0">
-            <a:spAutoFit/>
-          </a:bodyPr>
-          <a:lstStyle/>
-          <a:p>
-            <a:r>
-              <a:rPr lang="en-US" sz="1200" dirty="0" smtClean="0">
-                <a:solidFill>
-                  <a:srgbClr val="FF0000"/>
-                </a:solidFill>
-              </a:rPr>
-              <a:t>Pipelined</a:t>
-            </a:r>
-            <a:endParaRPr lang="en-US" sz="1200" dirty="0">
-              <a:solidFill>
-                <a:srgbClr val="FF0000"/>
-              </a:solidFill>
-            </a:endParaRPr>
-          </a:p>
-        </p:txBody>
-      </p:sp>
-      <p:sp>
-        <p:nvSpPr>
-          <p:cNvPr id="114" name="TextBox 113"/>
-          <p:cNvSpPr txBox="1"/>
-          <p:nvPr/>
-        </p:nvSpPr>
-        <p:spPr>
-          <a:xfrm>
-            <a:off x="7286137" y="1284262"/>
-            <a:ext cx="764953" cy="276999"/>
-          </a:xfrm>
-          <a:prstGeom prst="rect">
-            <a:avLst/>
-          </a:prstGeom>
-          <a:noFill/>
-        </p:spPr>
-        <p:txBody>
-          <a:bodyPr wrap="none" rtlCol="0">
-            <a:spAutoFit/>
-          </a:bodyPr>
-          <a:lstStyle/>
-          <a:p>
-            <a:r>
-              <a:rPr lang="en-US" sz="1200" dirty="0" smtClean="0">
-                <a:solidFill>
-                  <a:srgbClr val="FF0000"/>
-                </a:solidFill>
-              </a:rPr>
-              <a:t>Pipelined</a:t>
-            </a:r>
-            <a:endParaRPr lang="en-US" sz="1200" dirty="0">
-              <a:solidFill>
-                <a:srgbClr val="FF0000"/>
-              </a:solidFill>
-            </a:endParaRPr>
-          </a:p>
-        </p:txBody>
-      </p:sp>
-      <p:sp>
-        <p:nvSpPr>
-          <p:cNvPr id="116" name="TextBox 115"/>
-          <p:cNvSpPr txBox="1"/>
-          <p:nvPr/>
-        </p:nvSpPr>
-        <p:spPr>
-          <a:xfrm>
-            <a:off x="9703930" y="1383432"/>
-            <a:ext cx="764953" cy="276999"/>
-          </a:xfrm>
-          <a:prstGeom prst="rect">
-            <a:avLst/>
-          </a:prstGeom>
-          <a:noFill/>
-        </p:spPr>
-        <p:txBody>
-          <a:bodyPr wrap="none" rtlCol="0">
-            <a:spAutoFit/>
-          </a:bodyPr>
-          <a:lstStyle/>
-          <a:p>
-            <a:r>
-              <a:rPr lang="en-US" sz="1200" dirty="0" smtClean="0">
-                <a:solidFill>
-                  <a:srgbClr val="FF0000"/>
-                </a:solidFill>
-              </a:rPr>
-              <a:t>Pipelined</a:t>
-            </a:r>
-            <a:endParaRPr lang="en-US" sz="1200" dirty="0">
-              <a:solidFill>
-                <a:srgbClr val="FF0000"/>
-              </a:solidFill>
-            </a:endParaRPr>
-          </a:p>
-        </p:txBody>
-      </p:sp>
-      <p:sp>
-        <p:nvSpPr>
-          <p:cNvPr id="117" name="TextBox 116"/>
-          <p:cNvSpPr txBox="1"/>
-          <p:nvPr/>
-        </p:nvSpPr>
-        <p:spPr>
-          <a:xfrm>
-            <a:off x="8226519" y="2451445"/>
-            <a:ext cx="764953" cy="276999"/>
-          </a:xfrm>
-          <a:prstGeom prst="rect">
-            <a:avLst/>
-          </a:prstGeom>
-          <a:noFill/>
-        </p:spPr>
-        <p:txBody>
-          <a:bodyPr wrap="none" rtlCol="0">
-            <a:spAutoFit/>
-          </a:bodyPr>
-          <a:lstStyle/>
-          <a:p>
-            <a:r>
-              <a:rPr lang="en-US" sz="1200" dirty="0" smtClean="0">
-                <a:solidFill>
-                  <a:srgbClr val="FF0000"/>
-                </a:solidFill>
-              </a:rPr>
-              <a:t>Pipelined</a:t>
-            </a:r>
-            <a:endParaRPr lang="en-US" sz="1200" dirty="0">
-              <a:solidFill>
-                <a:srgbClr val="FF0000"/>
-              </a:solidFill>
-            </a:endParaRPr>
-          </a:p>
-        </p:txBody>
-      </p:sp>
-      <p:sp>
-        <p:nvSpPr>
-          <p:cNvPr id="118" name="TextBox 117"/>
-          <p:cNvSpPr txBox="1"/>
-          <p:nvPr/>
-        </p:nvSpPr>
-        <p:spPr>
-          <a:xfrm>
-            <a:off x="4990629" y="2169340"/>
-            <a:ext cx="420308" cy="276999"/>
-          </a:xfrm>
-          <a:prstGeom prst="rect">
-            <a:avLst/>
-          </a:prstGeom>
-          <a:noFill/>
-        </p:spPr>
-        <p:txBody>
-          <a:bodyPr wrap="none" rtlCol="0">
-            <a:spAutoFit/>
-          </a:bodyPr>
-          <a:lstStyle/>
-          <a:p>
-            <a:r>
-              <a:rPr lang="en-US" sz="1200" dirty="0" smtClean="0">
-                <a:solidFill>
-                  <a:srgbClr val="00B050"/>
-                </a:solidFill>
-              </a:rPr>
-              <a:t>100</a:t>
-            </a:r>
-            <a:endParaRPr lang="en-US" sz="1200" dirty="0">
-              <a:solidFill>
-                <a:srgbClr val="00B050"/>
-              </a:solidFill>
-            </a:endParaRPr>
-          </a:p>
-        </p:txBody>
-      </p:sp>
-      <p:sp>
-        <p:nvSpPr>
-          <p:cNvPr id="119" name="TextBox 118"/>
-          <p:cNvSpPr txBox="1"/>
-          <p:nvPr/>
-        </p:nvSpPr>
-        <p:spPr>
-          <a:xfrm>
-            <a:off x="4861606" y="3431360"/>
+            <a:off x="11405095" y="1052885"/>
             <a:ext cx="612668" cy="276999"/>
           </a:xfrm>
           <a:prstGeom prst="rect">
@@ -5498,89 +5838,13 @@
       </p:sp>
       <p:sp>
         <p:nvSpPr>
-          <p:cNvPr id="120" name="TextBox 119"/>
+          <p:cNvPr id="53" name="TextBox 52"/>
           <p:cNvSpPr txBox="1"/>
           <p:nvPr/>
         </p:nvSpPr>
         <p:spPr>
           <a:xfrm>
-            <a:off x="7382450" y="961730"/>
-            <a:ext cx="612668" cy="276999"/>
-          </a:xfrm>
-          <a:prstGeom prst="rect">
-            <a:avLst/>
-          </a:prstGeom>
-          <a:noFill/>
-        </p:spPr>
-        <p:txBody>
-          <a:bodyPr wrap="none" rtlCol="0">
-            <a:spAutoFit/>
-          </a:bodyPr>
-          <a:lstStyle/>
-          <a:p>
-            <a:r>
-              <a:rPr lang="en-US" sz="1200" dirty="0" smtClean="0">
-                <a:solidFill>
-                  <a:srgbClr val="00B050"/>
-                </a:solidFill>
-              </a:rPr>
-              <a:t>20 000</a:t>
-            </a:r>
-            <a:endParaRPr lang="en-US" sz="1200" dirty="0">
-              <a:solidFill>
-                <a:srgbClr val="00B050"/>
-              </a:solidFill>
-            </a:endParaRPr>
-          </a:p>
-        </p:txBody>
-      </p:sp>
-      <p:sp>
-        <p:nvSpPr>
-          <p:cNvPr id="121" name="TextBox 120"/>
-          <p:cNvSpPr txBox="1"/>
-          <p:nvPr/>
-        </p:nvSpPr>
-        <p:spPr>
-          <a:xfrm>
-            <a:off x="7723143" y="1576024"/>
-            <a:ext cx="420308" cy="276999"/>
-          </a:xfrm>
-          <a:prstGeom prst="rect">
-            <a:avLst/>
-          </a:prstGeom>
-          <a:noFill/>
-        </p:spPr>
-        <p:txBody>
-          <a:bodyPr wrap="none" rtlCol="0">
-            <a:spAutoFit/>
-          </a:bodyPr>
-          <a:lstStyle/>
-          <a:p>
-            <a:r>
-              <a:rPr lang="en-US" sz="1200" dirty="0" smtClean="0">
-                <a:solidFill>
-                  <a:srgbClr val="00B050"/>
-                </a:solidFill>
-              </a:rPr>
-              <a:t>100</a:t>
-            </a:r>
-            <a:endParaRPr lang="en-US" sz="1200" dirty="0">
-              <a:solidFill>
-                <a:srgbClr val="00B050"/>
-              </a:solidFill>
-            </a:endParaRPr>
-          </a:p>
-        </p:txBody>
-      </p:sp>
-      <p:sp>
-        <p:nvSpPr>
-          <p:cNvPr id="122" name="TextBox 121"/>
-          <p:cNvSpPr txBox="1"/>
-          <p:nvPr/>
-        </p:nvSpPr>
-        <p:spPr>
-          <a:xfrm>
-            <a:off x="8565763" y="2726607"/>
+            <a:off x="9996312" y="2136064"/>
             <a:ext cx="612668" cy="276999"/>
           </a:xfrm>
           <a:prstGeom prst="rect">
@@ -5601,158 +5865,6 @@
                 </a:solidFill>
               </a:rPr>
               <a:t>80 000</a:t>
-            </a:r>
-            <a:endParaRPr lang="en-US" sz="1200" dirty="0">
-              <a:solidFill>
-                <a:srgbClr val="00B050"/>
-              </a:solidFill>
-            </a:endParaRPr>
-          </a:p>
-        </p:txBody>
-      </p:sp>
-      <p:sp>
-        <p:nvSpPr>
-          <p:cNvPr id="123" name="TextBox 122"/>
-          <p:cNvSpPr txBox="1"/>
-          <p:nvPr/>
-        </p:nvSpPr>
-        <p:spPr>
-          <a:xfrm>
-            <a:off x="9318714" y="1836964"/>
-            <a:ext cx="805029" cy="276999"/>
-          </a:xfrm>
-          <a:prstGeom prst="rect">
-            <a:avLst/>
-          </a:prstGeom>
-          <a:noFill/>
-        </p:spPr>
-        <p:txBody>
-          <a:bodyPr wrap="none" rtlCol="0">
-            <a:spAutoFit/>
-          </a:bodyPr>
-          <a:lstStyle/>
-          <a:p>
-            <a:r>
-              <a:rPr lang="en-US" sz="1200" dirty="0" smtClean="0">
-                <a:solidFill>
-                  <a:srgbClr val="00B050"/>
-                </a:solidFill>
-              </a:rPr>
-              <a:t>2 000 000</a:t>
-            </a:r>
-            <a:endParaRPr lang="en-US" sz="1200" dirty="0">
-              <a:solidFill>
-                <a:srgbClr val="00B050"/>
-              </a:solidFill>
-            </a:endParaRPr>
-          </a:p>
-        </p:txBody>
-      </p:sp>
-      <p:sp>
-        <p:nvSpPr>
-          <p:cNvPr id="124" name="TextBox 123"/>
-          <p:cNvSpPr txBox="1"/>
-          <p:nvPr/>
-        </p:nvSpPr>
-        <p:spPr>
-          <a:xfrm>
-            <a:off x="3491671" y="698265"/>
-            <a:ext cx="612668" cy="276999"/>
-          </a:xfrm>
-          <a:prstGeom prst="rect">
-            <a:avLst/>
-          </a:prstGeom>
-          <a:noFill/>
-        </p:spPr>
-        <p:txBody>
-          <a:bodyPr wrap="none" rtlCol="0">
-            <a:spAutoFit/>
-          </a:bodyPr>
-          <a:lstStyle/>
-          <a:p>
-            <a:r>
-              <a:rPr lang="en-US" sz="1200" dirty="0" smtClean="0">
-                <a:solidFill>
-                  <a:srgbClr val="00B050"/>
-                </a:solidFill>
-              </a:rPr>
-              <a:t>20 000</a:t>
-            </a:r>
-            <a:endParaRPr lang="en-US" sz="1200" dirty="0">
-              <a:solidFill>
-                <a:srgbClr val="00B050"/>
-              </a:solidFill>
-            </a:endParaRPr>
-          </a:p>
-        </p:txBody>
-      </p:sp>
-      <p:sp>
-        <p:nvSpPr>
-          <p:cNvPr id="125" name="TextBox 124"/>
-          <p:cNvSpPr txBox="1"/>
-          <p:nvPr/>
-        </p:nvSpPr>
-        <p:spPr>
-          <a:xfrm>
-            <a:off x="1955348" y="2111231"/>
-            <a:ext cx="534121" cy="276999"/>
-          </a:xfrm>
-          <a:prstGeom prst="rect">
-            <a:avLst/>
-          </a:prstGeom>
-          <a:noFill/>
-        </p:spPr>
-        <p:txBody>
-          <a:bodyPr wrap="none" rtlCol="0">
-            <a:spAutoFit/>
-          </a:bodyPr>
-          <a:lstStyle/>
-          <a:p>
-            <a:r>
-              <a:rPr lang="en-US" sz="1200" dirty="0" smtClean="0">
-                <a:solidFill>
-                  <a:srgbClr val="00B050"/>
-                </a:solidFill>
-              </a:rPr>
-              <a:t>1 000</a:t>
-            </a:r>
-            <a:endParaRPr lang="en-US" sz="1200" dirty="0">
-              <a:solidFill>
-                <a:srgbClr val="00B050"/>
-              </a:solidFill>
-            </a:endParaRPr>
-          </a:p>
-        </p:txBody>
-      </p:sp>
-      <p:sp>
-        <p:nvSpPr>
-          <p:cNvPr id="126" name="TextBox 125"/>
-          <p:cNvSpPr txBox="1"/>
-          <p:nvPr/>
-        </p:nvSpPr>
-        <p:spPr>
-          <a:xfrm>
-            <a:off x="1846014" y="3427484"/>
-            <a:ext cx="805029" cy="276999"/>
-          </a:xfrm>
-          <a:prstGeom prst="rect">
-            <a:avLst/>
-          </a:prstGeom>
-          <a:noFill/>
-        </p:spPr>
-        <p:txBody>
-          <a:bodyPr wrap="none" rtlCol="0">
-            <a:spAutoFit/>
-          </a:bodyPr>
-          <a:lstStyle/>
-          <a:p>
-            <a:r>
-              <a:rPr lang="en-US" sz="1200" dirty="0" smtClean="0">
-                <a:solidFill>
-                  <a:srgbClr val="00B050"/>
-                </a:solidFill>
-              </a:rPr>
-              <a:t>4 000 000</a:t>
             </a:r>
             <a:endParaRPr lang="en-US" sz="1200" dirty="0">
               <a:solidFill>

</xml_diff>

<commit_message>
comp 421 a3 nearly done
</commit_message>
<xml_diff>
--- a/Comp 421/Assignment/Assignment 3/Ass3.pptx
+++ b/Comp 421/Assignment/Assignment 3/Ass3.pptx
@@ -2978,8 +2978,8 @@
         </p:nvSpPr>
         <p:spPr>
           <a:xfrm>
-            <a:off x="189402" y="1756138"/>
-            <a:ext cx="2058763" cy="613838"/>
+            <a:off x="2510246" y="326243"/>
+            <a:ext cx="1569451" cy="377763"/>
           </a:xfrm>
           <a:prstGeom prst="rect">
             <a:avLst/>
@@ -3008,7 +3008,7 @@
           <a:p>
             <a:pPr algn="ctr"/>
             <a:r>
-              <a:rPr lang="en-US" dirty="0" smtClean="0">
+              <a:rPr lang="en-US" sz="1200" dirty="0" smtClean="0">
                 <a:solidFill>
                   <a:schemeClr val="tx1">
                     <a:lumMod val="75000"/>
@@ -3018,7 +3018,7 @@
               </a:rPr>
               <a:t>Type, Producer</a:t>
             </a:r>
-            <a:endParaRPr lang="en-US" dirty="0">
+            <a:endParaRPr lang="en-US" sz="1200" dirty="0">
               <a:solidFill>
                 <a:schemeClr val="tx1">
                   <a:lumMod val="75000"/>
@@ -3037,8 +3037,8 @@
         </p:nvSpPr>
         <p:spPr>
           <a:xfrm>
-            <a:off x="3097613" y="1756138"/>
-            <a:ext cx="2058763" cy="613838"/>
+            <a:off x="4718045" y="326243"/>
+            <a:ext cx="1569451" cy="377763"/>
           </a:xfrm>
           <a:prstGeom prst="rect">
             <a:avLst/>
@@ -3067,7 +3067,7 @@
           <a:p>
             <a:pPr algn="ctr"/>
             <a:r>
-              <a:rPr lang="en-US" dirty="0" smtClean="0">
+              <a:rPr lang="en-US" sz="1200" dirty="0" smtClean="0">
                 <a:solidFill>
                   <a:schemeClr val="tx1">
                     <a:lumMod val="75000"/>
@@ -3077,7 +3077,7 @@
               </a:rPr>
               <a:t>Group by type</a:t>
             </a:r>
-            <a:endParaRPr lang="en-US" dirty="0">
+            <a:endParaRPr lang="en-US" sz="1200" dirty="0">
               <a:solidFill>
                 <a:schemeClr val="tx1">
                   <a:lumMod val="75000"/>
@@ -3096,8 +3096,8 @@
         </p:nvSpPr>
         <p:spPr>
           <a:xfrm>
-            <a:off x="6005824" y="1756138"/>
-            <a:ext cx="2058763" cy="613838"/>
+            <a:off x="6841530" y="326244"/>
+            <a:ext cx="1569451" cy="377763"/>
           </a:xfrm>
           <a:prstGeom prst="rect">
             <a:avLst/>
@@ -3126,7 +3126,7 @@
           <a:p>
             <a:pPr algn="ctr"/>
             <a:r>
-              <a:rPr lang="en-US" dirty="0" smtClean="0">
+              <a:rPr lang="en-US" sz="1200" dirty="0" smtClean="0">
                 <a:solidFill>
                   <a:schemeClr val="tx1">
                     <a:lumMod val="75000"/>
@@ -3136,7 +3136,7 @@
               </a:rPr>
               <a:t>Count all and count distinct producer</a:t>
             </a:r>
-            <a:endParaRPr lang="en-US" dirty="0">
+            <a:endParaRPr lang="en-US" sz="1200" dirty="0">
               <a:solidFill>
                 <a:schemeClr val="tx1">
                   <a:lumMod val="75000"/>
@@ -3155,8 +3155,8 @@
         </p:nvSpPr>
         <p:spPr>
           <a:xfrm>
-            <a:off x="8914035" y="1756138"/>
-            <a:ext cx="2058763" cy="613838"/>
+            <a:off x="8965015" y="326243"/>
+            <a:ext cx="1569451" cy="377763"/>
           </a:xfrm>
           <a:prstGeom prst="rect">
             <a:avLst/>
@@ -3185,7 +3185,7 @@
           <a:p>
             <a:pPr algn="ctr"/>
             <a:r>
-              <a:rPr lang="en-US" dirty="0" smtClean="0">
+              <a:rPr lang="en-US" sz="1200" dirty="0" smtClean="0">
                 <a:solidFill>
                   <a:schemeClr val="tx1">
                     <a:lumMod val="75000"/>
@@ -3195,7 +3195,7 @@
               </a:rPr>
               <a:t>Selection where count all &gt;300</a:t>
             </a:r>
-            <a:endParaRPr lang="en-US" dirty="0">
+            <a:endParaRPr lang="en-US" sz="1200" dirty="0">
               <a:solidFill>
                 <a:schemeClr val="tx1">
                   <a:lumMod val="75000"/>
@@ -3214,8 +3214,8 @@
         </p:nvSpPr>
         <p:spPr>
           <a:xfrm>
-            <a:off x="909403" y="2587518"/>
-            <a:ext cx="618759" cy="369332"/>
+            <a:off x="2944641" y="704006"/>
+            <a:ext cx="471697" cy="276999"/>
           </a:xfrm>
           <a:prstGeom prst="rect">
             <a:avLst/>
@@ -3223,16 +3223,16 @@
           <a:noFill/>
         </p:spPr>
         <p:txBody>
-          <a:bodyPr wrap="none" rtlCol="0">
+          <a:bodyPr wrap="square" rtlCol="0">
             <a:spAutoFit/>
           </a:bodyPr>
           <a:lstStyle/>
           <a:p>
             <a:r>
-              <a:rPr lang="en-US" dirty="0" smtClean="0"/>
+              <a:rPr lang="en-US" sz="1200" dirty="0" smtClean="0"/>
               <a:t>Scan</a:t>
             </a:r>
-            <a:endParaRPr lang="en-US" dirty="0"/>
+            <a:endParaRPr lang="en-US" sz="1200" dirty="0"/>
           </a:p>
         </p:txBody>
       </p:sp>
@@ -3244,8 +3244,8 @@
         </p:nvSpPr>
         <p:spPr>
           <a:xfrm>
-            <a:off x="3842300" y="2587518"/>
-            <a:ext cx="569387" cy="369332"/>
+            <a:off x="5355013" y="664008"/>
+            <a:ext cx="846789" cy="276999"/>
           </a:xfrm>
           <a:prstGeom prst="rect">
             <a:avLst/>
@@ -3253,16 +3253,16 @@
           <a:noFill/>
         </p:spPr>
         <p:txBody>
-          <a:bodyPr wrap="none" rtlCol="0">
+          <a:bodyPr wrap="square" rtlCol="0">
             <a:spAutoFit/>
           </a:bodyPr>
           <a:lstStyle/>
           <a:p>
             <a:r>
-              <a:rPr lang="en-US" dirty="0" smtClean="0"/>
+              <a:rPr lang="en-US" sz="1200" dirty="0" smtClean="0"/>
               <a:t>Sort</a:t>
             </a:r>
-            <a:endParaRPr lang="en-US" dirty="0"/>
+            <a:endParaRPr lang="en-US" sz="1200" dirty="0"/>
           </a:p>
         </p:txBody>
       </p:sp>
@@ -3274,8 +3274,8 @@
         </p:nvSpPr>
         <p:spPr>
           <a:xfrm>
-            <a:off x="9634036" y="2587518"/>
-            <a:ext cx="618759" cy="369332"/>
+            <a:off x="9601983" y="704006"/>
+            <a:ext cx="471697" cy="276999"/>
           </a:xfrm>
           <a:prstGeom prst="rect">
             <a:avLst/>
@@ -3283,16 +3283,16 @@
           <a:noFill/>
         </p:spPr>
         <p:txBody>
-          <a:bodyPr wrap="none" rtlCol="0">
+          <a:bodyPr wrap="square" rtlCol="0">
             <a:spAutoFit/>
           </a:bodyPr>
           <a:lstStyle/>
           <a:p>
             <a:r>
-              <a:rPr lang="en-US" dirty="0" smtClean="0"/>
+              <a:rPr lang="en-US" sz="1200" dirty="0" smtClean="0"/>
               <a:t>Scan</a:t>
             </a:r>
-            <a:endParaRPr lang="en-US" dirty="0"/>
+            <a:endParaRPr lang="en-US" sz="1200" dirty="0"/>
           </a:p>
         </p:txBody>
       </p:sp>
@@ -3304,8 +3304,8 @@
         </p:nvSpPr>
         <p:spPr>
           <a:xfrm>
-            <a:off x="6725825" y="2587518"/>
-            <a:ext cx="618759" cy="369332"/>
+            <a:off x="7478498" y="704470"/>
+            <a:ext cx="471697" cy="276999"/>
           </a:xfrm>
           <a:prstGeom prst="rect">
             <a:avLst/>
@@ -3313,16 +3313,16 @@
           <a:noFill/>
         </p:spPr>
         <p:txBody>
-          <a:bodyPr wrap="none" rtlCol="0">
+          <a:bodyPr wrap="square" rtlCol="0">
             <a:spAutoFit/>
           </a:bodyPr>
           <a:lstStyle/>
           <a:p>
             <a:r>
-              <a:rPr lang="en-US" dirty="0" smtClean="0"/>
+              <a:rPr lang="en-US" sz="1200" dirty="0" smtClean="0"/>
               <a:t>Scan</a:t>
             </a:r>
-            <a:endParaRPr lang="en-US" dirty="0"/>
+            <a:endParaRPr lang="en-US" sz="1200" dirty="0"/>
           </a:p>
         </p:txBody>
       </p:sp>
@@ -3336,9 +3336,9 @@
           <p:nvPr/>
         </p:nvCxnSpPr>
         <p:spPr>
-          <a:xfrm>
-            <a:off x="8064587" y="2063057"/>
-            <a:ext cx="849448" cy="0"/>
+          <a:xfrm flipV="1">
+            <a:off x="8410981" y="515125"/>
+            <a:ext cx="554034" cy="1"/>
           </a:xfrm>
           <a:prstGeom prst="straightConnector1">
             <a:avLst/>
@@ -3373,8 +3373,8 @@
         </p:nvCxnSpPr>
         <p:spPr>
           <a:xfrm>
-            <a:off x="5156376" y="2063057"/>
-            <a:ext cx="849448" cy="0"/>
+            <a:off x="6287496" y="515125"/>
+            <a:ext cx="554034" cy="1"/>
           </a:xfrm>
           <a:prstGeom prst="straightConnector1">
             <a:avLst/>
@@ -3409,8 +3409,8 @@
         </p:nvCxnSpPr>
         <p:spPr>
           <a:xfrm>
-            <a:off x="2248165" y="2063057"/>
-            <a:ext cx="849448" cy="0"/>
+            <a:off x="4079697" y="515125"/>
+            <a:ext cx="638348" cy="0"/>
           </a:xfrm>
           <a:prstGeom prst="straightConnector1">
             <a:avLst/>
@@ -3434,6 +3434,807 @@
           </a:fontRef>
         </p:style>
       </p:cxnSp>
+      <p:sp>
+        <p:nvSpPr>
+          <p:cNvPr id="37" name="Oval 36"/>
+          <p:cNvSpPr/>
+          <p:nvPr/>
+        </p:nvSpPr>
+        <p:spPr>
+          <a:xfrm>
+            <a:off x="385381" y="326243"/>
+            <a:ext cx="1569451" cy="377763"/>
+          </a:xfrm>
+          <a:prstGeom prst="ellipse">
+            <a:avLst/>
+          </a:prstGeom>
+          <a:noFill/>
+        </p:spPr>
+        <p:style>
+          <a:lnRef idx="2">
+            <a:schemeClr val="accent1">
+              <a:shade val="50000"/>
+            </a:schemeClr>
+          </a:lnRef>
+          <a:fillRef idx="1">
+            <a:schemeClr val="accent1"/>
+          </a:fillRef>
+          <a:effectRef idx="0">
+            <a:schemeClr val="accent1"/>
+          </a:effectRef>
+          <a:fontRef idx="minor">
+            <a:schemeClr val="lt1"/>
+          </a:fontRef>
+        </p:style>
+        <p:txBody>
+          <a:bodyPr rtlCol="0" anchor="ctr"/>
+          <a:lstStyle/>
+          <a:p>
+            <a:pPr algn="ctr"/>
+            <a:r>
+              <a:rPr lang="en-US" sz="1200" dirty="0" smtClean="0">
+                <a:solidFill>
+                  <a:schemeClr val="tx1">
+                    <a:lumMod val="75000"/>
+                    <a:lumOff val="25000"/>
+                  </a:schemeClr>
+                </a:solidFill>
+              </a:rPr>
+              <a:t>Product</a:t>
+            </a:r>
+            <a:endParaRPr lang="en-US" sz="1200" dirty="0">
+              <a:solidFill>
+                <a:schemeClr val="tx1">
+                  <a:lumMod val="75000"/>
+                  <a:lumOff val="25000"/>
+                </a:schemeClr>
+              </a:solidFill>
+            </a:endParaRPr>
+          </a:p>
+        </p:txBody>
+      </p:sp>
+      <p:cxnSp>
+        <p:nvCxnSpPr>
+          <p:cNvPr id="39" name="Straight Arrow Connector 38"/>
+          <p:cNvCxnSpPr>
+            <a:stCxn id="37" idx="6"/>
+            <a:endCxn id="4" idx="1"/>
+          </p:cNvCxnSpPr>
+          <p:nvPr/>
+        </p:nvCxnSpPr>
+        <p:spPr>
+          <a:xfrm>
+            <a:off x="1954832" y="515125"/>
+            <a:ext cx="555414" cy="0"/>
+          </a:xfrm>
+          <a:prstGeom prst="straightConnector1">
+            <a:avLst/>
+          </a:prstGeom>
+          <a:ln>
+            <a:tailEnd type="triangle"/>
+          </a:ln>
+        </p:spPr>
+        <p:style>
+          <a:lnRef idx="1">
+            <a:schemeClr val="accent1"/>
+          </a:lnRef>
+          <a:fillRef idx="0">
+            <a:schemeClr val="accent1"/>
+          </a:fillRef>
+          <a:effectRef idx="0">
+            <a:schemeClr val="accent1"/>
+          </a:effectRef>
+          <a:fontRef idx="minor">
+            <a:schemeClr val="tx1"/>
+          </a:fontRef>
+        </p:style>
+      </p:cxnSp>
+      <p:sp>
+        <p:nvSpPr>
+          <p:cNvPr id="54" name="Rectangle 53"/>
+          <p:cNvSpPr/>
+          <p:nvPr/>
+        </p:nvSpPr>
+        <p:spPr>
+          <a:xfrm>
+            <a:off x="2631612" y="3035726"/>
+            <a:ext cx="1569451" cy="377763"/>
+          </a:xfrm>
+          <a:prstGeom prst="rect">
+            <a:avLst/>
+          </a:prstGeom>
+          <a:noFill/>
+        </p:spPr>
+        <p:style>
+          <a:lnRef idx="2">
+            <a:schemeClr val="accent1">
+              <a:shade val="50000"/>
+            </a:schemeClr>
+          </a:lnRef>
+          <a:fillRef idx="1">
+            <a:schemeClr val="accent1"/>
+          </a:fillRef>
+          <a:effectRef idx="0">
+            <a:schemeClr val="accent1"/>
+          </a:effectRef>
+          <a:fontRef idx="minor">
+            <a:schemeClr val="lt1"/>
+          </a:fontRef>
+        </p:style>
+        <p:txBody>
+          <a:bodyPr rtlCol="0" anchor="ctr"/>
+          <a:lstStyle/>
+          <a:p>
+            <a:pPr algn="ctr"/>
+            <a:r>
+              <a:rPr lang="en-US" sz="1200" dirty="0" smtClean="0">
+                <a:solidFill>
+                  <a:schemeClr val="tx1">
+                    <a:lumMod val="75000"/>
+                    <a:lumOff val="25000"/>
+                  </a:schemeClr>
+                </a:solidFill>
+              </a:rPr>
+              <a:t>Type, Producer</a:t>
+            </a:r>
+            <a:endParaRPr lang="en-US" sz="1200" dirty="0">
+              <a:solidFill>
+                <a:schemeClr val="tx1">
+                  <a:lumMod val="75000"/>
+                  <a:lumOff val="25000"/>
+                </a:schemeClr>
+              </a:solidFill>
+            </a:endParaRPr>
+          </a:p>
+        </p:txBody>
+      </p:sp>
+      <p:sp>
+        <p:nvSpPr>
+          <p:cNvPr id="55" name="Rectangle 54"/>
+          <p:cNvSpPr/>
+          <p:nvPr/>
+        </p:nvSpPr>
+        <p:spPr>
+          <a:xfrm>
+            <a:off x="4839411" y="3035726"/>
+            <a:ext cx="1569451" cy="377763"/>
+          </a:xfrm>
+          <a:prstGeom prst="rect">
+            <a:avLst/>
+          </a:prstGeom>
+          <a:noFill/>
+        </p:spPr>
+        <p:style>
+          <a:lnRef idx="2">
+            <a:schemeClr val="accent1">
+              <a:shade val="50000"/>
+            </a:schemeClr>
+          </a:lnRef>
+          <a:fillRef idx="1">
+            <a:schemeClr val="accent1"/>
+          </a:fillRef>
+          <a:effectRef idx="0">
+            <a:schemeClr val="accent1"/>
+          </a:effectRef>
+          <a:fontRef idx="minor">
+            <a:schemeClr val="lt1"/>
+          </a:fontRef>
+        </p:style>
+        <p:txBody>
+          <a:bodyPr rtlCol="0" anchor="ctr"/>
+          <a:lstStyle/>
+          <a:p>
+            <a:pPr algn="ctr"/>
+            <a:r>
+              <a:rPr lang="en-US" sz="1200" dirty="0" smtClean="0">
+                <a:solidFill>
+                  <a:schemeClr val="tx1">
+                    <a:lumMod val="75000"/>
+                    <a:lumOff val="25000"/>
+                  </a:schemeClr>
+                </a:solidFill>
+              </a:rPr>
+              <a:t>Group by type</a:t>
+            </a:r>
+            <a:endParaRPr lang="en-US" sz="1200" dirty="0">
+              <a:solidFill>
+                <a:schemeClr val="tx1">
+                  <a:lumMod val="75000"/>
+                  <a:lumOff val="25000"/>
+                </a:schemeClr>
+              </a:solidFill>
+            </a:endParaRPr>
+          </a:p>
+        </p:txBody>
+      </p:sp>
+      <p:sp>
+        <p:nvSpPr>
+          <p:cNvPr id="56" name="Rectangle 55"/>
+          <p:cNvSpPr/>
+          <p:nvPr/>
+        </p:nvSpPr>
+        <p:spPr>
+          <a:xfrm>
+            <a:off x="6962896" y="3035727"/>
+            <a:ext cx="1569451" cy="377763"/>
+          </a:xfrm>
+          <a:prstGeom prst="rect">
+            <a:avLst/>
+          </a:prstGeom>
+          <a:noFill/>
+        </p:spPr>
+        <p:style>
+          <a:lnRef idx="2">
+            <a:schemeClr val="accent1">
+              <a:shade val="50000"/>
+            </a:schemeClr>
+          </a:lnRef>
+          <a:fillRef idx="1">
+            <a:schemeClr val="accent1"/>
+          </a:fillRef>
+          <a:effectRef idx="0">
+            <a:schemeClr val="accent1"/>
+          </a:effectRef>
+          <a:fontRef idx="minor">
+            <a:schemeClr val="lt1"/>
+          </a:fontRef>
+        </p:style>
+        <p:txBody>
+          <a:bodyPr rtlCol="0" anchor="ctr"/>
+          <a:lstStyle/>
+          <a:p>
+            <a:pPr algn="ctr"/>
+            <a:r>
+              <a:rPr lang="en-US" sz="1200" dirty="0" smtClean="0">
+                <a:solidFill>
+                  <a:schemeClr val="tx1">
+                    <a:lumMod val="75000"/>
+                    <a:lumOff val="25000"/>
+                  </a:schemeClr>
+                </a:solidFill>
+              </a:rPr>
+              <a:t>Count </a:t>
+            </a:r>
+            <a:r>
+              <a:rPr lang="en-US" sz="1200" dirty="0" smtClean="0">
+                <a:solidFill>
+                  <a:schemeClr val="tx1">
+                    <a:lumMod val="75000"/>
+                    <a:lumOff val="25000"/>
+                  </a:schemeClr>
+                </a:solidFill>
+              </a:rPr>
+              <a:t>all</a:t>
+            </a:r>
+            <a:endParaRPr lang="en-US" sz="1200" dirty="0">
+              <a:solidFill>
+                <a:schemeClr val="tx1">
+                  <a:lumMod val="75000"/>
+                  <a:lumOff val="25000"/>
+                </a:schemeClr>
+              </a:solidFill>
+            </a:endParaRPr>
+          </a:p>
+        </p:txBody>
+      </p:sp>
+      <p:sp>
+        <p:nvSpPr>
+          <p:cNvPr id="57" name="Rectangle 56"/>
+          <p:cNvSpPr/>
+          <p:nvPr/>
+        </p:nvSpPr>
+        <p:spPr>
+          <a:xfrm>
+            <a:off x="9086381" y="3035726"/>
+            <a:ext cx="1569451" cy="377763"/>
+          </a:xfrm>
+          <a:prstGeom prst="rect">
+            <a:avLst/>
+          </a:prstGeom>
+          <a:noFill/>
+        </p:spPr>
+        <p:style>
+          <a:lnRef idx="2">
+            <a:schemeClr val="accent1">
+              <a:shade val="50000"/>
+            </a:schemeClr>
+          </a:lnRef>
+          <a:fillRef idx="1">
+            <a:schemeClr val="accent1"/>
+          </a:fillRef>
+          <a:effectRef idx="0">
+            <a:schemeClr val="accent1"/>
+          </a:effectRef>
+          <a:fontRef idx="minor">
+            <a:schemeClr val="lt1"/>
+          </a:fontRef>
+        </p:style>
+        <p:txBody>
+          <a:bodyPr rtlCol="0" anchor="ctr"/>
+          <a:lstStyle/>
+          <a:p>
+            <a:pPr algn="ctr"/>
+            <a:r>
+              <a:rPr lang="en-US" sz="1200" dirty="0" smtClean="0">
+                <a:solidFill>
+                  <a:schemeClr val="tx1">
+                    <a:lumMod val="75000"/>
+                    <a:lumOff val="25000"/>
+                  </a:schemeClr>
+                </a:solidFill>
+              </a:rPr>
+              <a:t>Selection where count all &gt;300</a:t>
+            </a:r>
+            <a:endParaRPr lang="en-US" sz="1200" dirty="0">
+              <a:solidFill>
+                <a:schemeClr val="tx1">
+                  <a:lumMod val="75000"/>
+                  <a:lumOff val="25000"/>
+                </a:schemeClr>
+              </a:solidFill>
+            </a:endParaRPr>
+          </a:p>
+        </p:txBody>
+      </p:sp>
+      <p:sp>
+        <p:nvSpPr>
+          <p:cNvPr id="58" name="TextBox 57"/>
+          <p:cNvSpPr txBox="1"/>
+          <p:nvPr/>
+        </p:nvSpPr>
+        <p:spPr>
+          <a:xfrm>
+            <a:off x="3066007" y="3413489"/>
+            <a:ext cx="471697" cy="276999"/>
+          </a:xfrm>
+          <a:prstGeom prst="rect">
+            <a:avLst/>
+          </a:prstGeom>
+          <a:noFill/>
+        </p:spPr>
+        <p:txBody>
+          <a:bodyPr wrap="square" rtlCol="0">
+            <a:spAutoFit/>
+          </a:bodyPr>
+          <a:lstStyle/>
+          <a:p>
+            <a:r>
+              <a:rPr lang="en-US" sz="1200" dirty="0" smtClean="0"/>
+              <a:t>Scan</a:t>
+            </a:r>
+            <a:endParaRPr lang="en-US" sz="1200" dirty="0"/>
+          </a:p>
+        </p:txBody>
+      </p:sp>
+      <p:sp>
+        <p:nvSpPr>
+          <p:cNvPr id="59" name="TextBox 58"/>
+          <p:cNvSpPr txBox="1"/>
+          <p:nvPr/>
+        </p:nvSpPr>
+        <p:spPr>
+          <a:xfrm>
+            <a:off x="5476379" y="3373491"/>
+            <a:ext cx="471697" cy="276999"/>
+          </a:xfrm>
+          <a:prstGeom prst="rect">
+            <a:avLst/>
+          </a:prstGeom>
+          <a:noFill/>
+        </p:spPr>
+        <p:txBody>
+          <a:bodyPr wrap="square" rtlCol="0">
+            <a:spAutoFit/>
+          </a:bodyPr>
+          <a:lstStyle/>
+          <a:p>
+            <a:r>
+              <a:rPr lang="en-US" sz="1200" dirty="0" smtClean="0"/>
+              <a:t>Sort</a:t>
+            </a:r>
+            <a:endParaRPr lang="en-US" sz="1200" dirty="0"/>
+          </a:p>
+        </p:txBody>
+      </p:sp>
+      <p:sp>
+        <p:nvSpPr>
+          <p:cNvPr id="60" name="TextBox 59"/>
+          <p:cNvSpPr txBox="1"/>
+          <p:nvPr/>
+        </p:nvSpPr>
+        <p:spPr>
+          <a:xfrm>
+            <a:off x="10815773" y="3086107"/>
+            <a:ext cx="471697" cy="276999"/>
+          </a:xfrm>
+          <a:prstGeom prst="rect">
+            <a:avLst/>
+          </a:prstGeom>
+          <a:noFill/>
+        </p:spPr>
+        <p:txBody>
+          <a:bodyPr wrap="square" rtlCol="0">
+            <a:spAutoFit/>
+          </a:bodyPr>
+          <a:lstStyle/>
+          <a:p>
+            <a:r>
+              <a:rPr lang="en-US" sz="1200" dirty="0" smtClean="0"/>
+              <a:t>Scan</a:t>
+            </a:r>
+            <a:endParaRPr lang="en-US" sz="1200" dirty="0"/>
+          </a:p>
+        </p:txBody>
+      </p:sp>
+      <p:sp>
+        <p:nvSpPr>
+          <p:cNvPr id="61" name="TextBox 60"/>
+          <p:cNvSpPr txBox="1"/>
+          <p:nvPr/>
+        </p:nvSpPr>
+        <p:spPr>
+          <a:xfrm>
+            <a:off x="7599864" y="3413953"/>
+            <a:ext cx="471697" cy="276999"/>
+          </a:xfrm>
+          <a:prstGeom prst="rect">
+            <a:avLst/>
+          </a:prstGeom>
+          <a:noFill/>
+        </p:spPr>
+        <p:txBody>
+          <a:bodyPr wrap="square" rtlCol="0">
+            <a:spAutoFit/>
+          </a:bodyPr>
+          <a:lstStyle/>
+          <a:p>
+            <a:r>
+              <a:rPr lang="en-US" sz="1200" dirty="0" smtClean="0"/>
+              <a:t>Scan</a:t>
+            </a:r>
+            <a:endParaRPr lang="en-US" sz="1200" dirty="0"/>
+          </a:p>
+        </p:txBody>
+      </p:sp>
+      <p:cxnSp>
+        <p:nvCxnSpPr>
+          <p:cNvPr id="62" name="Straight Arrow Connector 61"/>
+          <p:cNvCxnSpPr>
+            <a:stCxn id="56" idx="3"/>
+            <a:endCxn id="57" idx="1"/>
+          </p:cNvCxnSpPr>
+          <p:nvPr/>
+        </p:nvCxnSpPr>
+        <p:spPr>
+          <a:xfrm flipV="1">
+            <a:off x="8532347" y="3224608"/>
+            <a:ext cx="554034" cy="1"/>
+          </a:xfrm>
+          <a:prstGeom prst="straightConnector1">
+            <a:avLst/>
+          </a:prstGeom>
+          <a:ln>
+            <a:tailEnd type="triangle"/>
+          </a:ln>
+        </p:spPr>
+        <p:style>
+          <a:lnRef idx="1">
+            <a:schemeClr val="accent1"/>
+          </a:lnRef>
+          <a:fillRef idx="0">
+            <a:schemeClr val="accent1"/>
+          </a:fillRef>
+          <a:effectRef idx="0">
+            <a:schemeClr val="accent1"/>
+          </a:effectRef>
+          <a:fontRef idx="minor">
+            <a:schemeClr val="tx1"/>
+          </a:fontRef>
+        </p:style>
+      </p:cxnSp>
+      <p:cxnSp>
+        <p:nvCxnSpPr>
+          <p:cNvPr id="63" name="Straight Arrow Connector 62"/>
+          <p:cNvCxnSpPr>
+            <a:stCxn id="55" idx="3"/>
+            <a:endCxn id="56" idx="1"/>
+          </p:cNvCxnSpPr>
+          <p:nvPr/>
+        </p:nvCxnSpPr>
+        <p:spPr>
+          <a:xfrm>
+            <a:off x="6408862" y="3224608"/>
+            <a:ext cx="554034" cy="1"/>
+          </a:xfrm>
+          <a:prstGeom prst="straightConnector1">
+            <a:avLst/>
+          </a:prstGeom>
+          <a:ln>
+            <a:tailEnd type="triangle"/>
+          </a:ln>
+        </p:spPr>
+        <p:style>
+          <a:lnRef idx="1">
+            <a:schemeClr val="accent1"/>
+          </a:lnRef>
+          <a:fillRef idx="0">
+            <a:schemeClr val="accent1"/>
+          </a:fillRef>
+          <a:effectRef idx="0">
+            <a:schemeClr val="accent1"/>
+          </a:effectRef>
+          <a:fontRef idx="minor">
+            <a:schemeClr val="tx1"/>
+          </a:fontRef>
+        </p:style>
+      </p:cxnSp>
+      <p:cxnSp>
+        <p:nvCxnSpPr>
+          <p:cNvPr id="64" name="Straight Arrow Connector 63"/>
+          <p:cNvCxnSpPr>
+            <a:stCxn id="54" idx="3"/>
+            <a:endCxn id="55" idx="1"/>
+          </p:cNvCxnSpPr>
+          <p:nvPr/>
+        </p:nvCxnSpPr>
+        <p:spPr>
+          <a:xfrm>
+            <a:off x="4201063" y="3224608"/>
+            <a:ext cx="638348" cy="0"/>
+          </a:xfrm>
+          <a:prstGeom prst="straightConnector1">
+            <a:avLst/>
+          </a:prstGeom>
+          <a:ln>
+            <a:tailEnd type="triangle"/>
+          </a:ln>
+        </p:spPr>
+        <p:style>
+          <a:lnRef idx="1">
+            <a:schemeClr val="accent1"/>
+          </a:lnRef>
+          <a:fillRef idx="0">
+            <a:schemeClr val="accent1"/>
+          </a:fillRef>
+          <a:effectRef idx="0">
+            <a:schemeClr val="accent1"/>
+          </a:effectRef>
+          <a:fontRef idx="minor">
+            <a:schemeClr val="tx1"/>
+          </a:fontRef>
+        </p:style>
+      </p:cxnSp>
+      <p:sp>
+        <p:nvSpPr>
+          <p:cNvPr id="65" name="Oval 64"/>
+          <p:cNvSpPr/>
+          <p:nvPr/>
+        </p:nvSpPr>
+        <p:spPr>
+          <a:xfrm>
+            <a:off x="506747" y="3035726"/>
+            <a:ext cx="1569451" cy="377763"/>
+          </a:xfrm>
+          <a:prstGeom prst="ellipse">
+            <a:avLst/>
+          </a:prstGeom>
+          <a:noFill/>
+        </p:spPr>
+        <p:style>
+          <a:lnRef idx="2">
+            <a:schemeClr val="accent1">
+              <a:shade val="50000"/>
+            </a:schemeClr>
+          </a:lnRef>
+          <a:fillRef idx="1">
+            <a:schemeClr val="accent1"/>
+          </a:fillRef>
+          <a:effectRef idx="0">
+            <a:schemeClr val="accent1"/>
+          </a:effectRef>
+          <a:fontRef idx="minor">
+            <a:schemeClr val="lt1"/>
+          </a:fontRef>
+        </p:style>
+        <p:txBody>
+          <a:bodyPr rtlCol="0" anchor="ctr"/>
+          <a:lstStyle/>
+          <a:p>
+            <a:pPr algn="ctr"/>
+            <a:r>
+              <a:rPr lang="en-US" sz="1200" dirty="0" smtClean="0">
+                <a:solidFill>
+                  <a:schemeClr val="tx1">
+                    <a:lumMod val="75000"/>
+                    <a:lumOff val="25000"/>
+                  </a:schemeClr>
+                </a:solidFill>
+              </a:rPr>
+              <a:t>Product</a:t>
+            </a:r>
+            <a:endParaRPr lang="en-US" sz="1200" dirty="0">
+              <a:solidFill>
+                <a:schemeClr val="tx1">
+                  <a:lumMod val="75000"/>
+                  <a:lumOff val="25000"/>
+                </a:schemeClr>
+              </a:solidFill>
+            </a:endParaRPr>
+          </a:p>
+        </p:txBody>
+      </p:sp>
+      <p:cxnSp>
+        <p:nvCxnSpPr>
+          <p:cNvPr id="66" name="Straight Arrow Connector 65"/>
+          <p:cNvCxnSpPr>
+            <a:stCxn id="65" idx="6"/>
+            <a:endCxn id="54" idx="1"/>
+          </p:cNvCxnSpPr>
+          <p:nvPr/>
+        </p:nvCxnSpPr>
+        <p:spPr>
+          <a:xfrm>
+            <a:off x="2076198" y="3224608"/>
+            <a:ext cx="555414" cy="0"/>
+          </a:xfrm>
+          <a:prstGeom prst="straightConnector1">
+            <a:avLst/>
+          </a:prstGeom>
+          <a:ln>
+            <a:tailEnd type="triangle"/>
+          </a:ln>
+        </p:spPr>
+        <p:style>
+          <a:lnRef idx="1">
+            <a:schemeClr val="accent1"/>
+          </a:lnRef>
+          <a:fillRef idx="0">
+            <a:schemeClr val="accent1"/>
+          </a:fillRef>
+          <a:effectRef idx="0">
+            <a:schemeClr val="accent1"/>
+          </a:effectRef>
+          <a:fontRef idx="minor">
+            <a:schemeClr val="tx1"/>
+          </a:fontRef>
+        </p:style>
+      </p:cxnSp>
+      <p:sp>
+        <p:nvSpPr>
+          <p:cNvPr id="68" name="Rectangle 67"/>
+          <p:cNvSpPr/>
+          <p:nvPr/>
+        </p:nvSpPr>
+        <p:spPr>
+          <a:xfrm>
+            <a:off x="9086381" y="4248183"/>
+            <a:ext cx="1569451" cy="377763"/>
+          </a:xfrm>
+          <a:prstGeom prst="rect">
+            <a:avLst/>
+          </a:prstGeom>
+          <a:noFill/>
+        </p:spPr>
+        <p:style>
+          <a:lnRef idx="2">
+            <a:schemeClr val="accent1">
+              <a:shade val="50000"/>
+            </a:schemeClr>
+          </a:lnRef>
+          <a:fillRef idx="1">
+            <a:schemeClr val="accent1"/>
+          </a:fillRef>
+          <a:effectRef idx="0">
+            <a:schemeClr val="accent1"/>
+          </a:effectRef>
+          <a:fontRef idx="minor">
+            <a:schemeClr val="lt1"/>
+          </a:fontRef>
+        </p:style>
+        <p:txBody>
+          <a:bodyPr rtlCol="0" anchor="ctr"/>
+          <a:lstStyle/>
+          <a:p>
+            <a:pPr algn="ctr"/>
+            <a:r>
+              <a:rPr lang="en-US" sz="1200" dirty="0" smtClean="0">
+                <a:solidFill>
+                  <a:schemeClr val="tx1">
+                    <a:lumMod val="75000"/>
+                    <a:lumOff val="25000"/>
+                  </a:schemeClr>
+                </a:solidFill>
+              </a:rPr>
+              <a:t>Count </a:t>
+            </a:r>
+            <a:r>
+              <a:rPr lang="en-US" sz="1200" dirty="0" smtClean="0">
+                <a:solidFill>
+                  <a:schemeClr val="tx1">
+                    <a:lumMod val="75000"/>
+                    <a:lumOff val="25000"/>
+                  </a:schemeClr>
+                </a:solidFill>
+              </a:rPr>
+              <a:t>distinct producer</a:t>
+            </a:r>
+            <a:endParaRPr lang="en-US" sz="1200" dirty="0">
+              <a:solidFill>
+                <a:schemeClr val="tx1">
+                  <a:lumMod val="75000"/>
+                  <a:lumOff val="25000"/>
+                </a:schemeClr>
+              </a:solidFill>
+            </a:endParaRPr>
+          </a:p>
+        </p:txBody>
+      </p:sp>
+      <p:cxnSp>
+        <p:nvCxnSpPr>
+          <p:cNvPr id="70" name="Straight Arrow Connector 69"/>
+          <p:cNvCxnSpPr>
+            <a:stCxn id="57" idx="2"/>
+            <a:endCxn id="68" idx="0"/>
+          </p:cNvCxnSpPr>
+          <p:nvPr/>
+        </p:nvCxnSpPr>
+        <p:spPr>
+          <a:xfrm>
+            <a:off x="9871107" y="3413489"/>
+            <a:ext cx="0" cy="834694"/>
+          </a:xfrm>
+          <a:prstGeom prst="straightConnector1">
+            <a:avLst/>
+          </a:prstGeom>
+          <a:ln>
+            <a:tailEnd type="triangle"/>
+          </a:ln>
+        </p:spPr>
+        <p:style>
+          <a:lnRef idx="1">
+            <a:schemeClr val="accent1"/>
+          </a:lnRef>
+          <a:fillRef idx="0">
+            <a:schemeClr val="accent1"/>
+          </a:fillRef>
+          <a:effectRef idx="0">
+            <a:schemeClr val="accent1"/>
+          </a:effectRef>
+          <a:fontRef idx="minor">
+            <a:schemeClr val="tx1"/>
+          </a:fontRef>
+        </p:style>
+      </p:cxnSp>
+      <p:sp>
+        <p:nvSpPr>
+          <p:cNvPr id="71" name="TextBox 70"/>
+          <p:cNvSpPr txBox="1"/>
+          <p:nvPr/>
+        </p:nvSpPr>
+        <p:spPr>
+          <a:xfrm>
+            <a:off x="10815773" y="4248183"/>
+            <a:ext cx="471697" cy="276999"/>
+          </a:xfrm>
+          <a:prstGeom prst="rect">
+            <a:avLst/>
+          </a:prstGeom>
+          <a:noFill/>
+        </p:spPr>
+        <p:txBody>
+          <a:bodyPr wrap="square" rtlCol="0">
+            <a:spAutoFit/>
+          </a:bodyPr>
+          <a:lstStyle/>
+          <a:p>
+            <a:r>
+              <a:rPr lang="en-US" sz="1200" dirty="0" smtClean="0"/>
+              <a:t>Scan</a:t>
+            </a:r>
+            <a:endParaRPr lang="en-US" sz="1200" dirty="0"/>
+          </a:p>
+        </p:txBody>
+      </p:sp>
     </p:spTree>
     <p:extLst>
       <p:ext uri="{BB962C8B-B14F-4D97-AF65-F5344CB8AC3E}">

</xml_diff>